<commit_message>
modify back to line diagram
</commit_message>
<xml_diff>
--- a/models/ForModelSheet/YousoGizyutu.pptx
+++ b/models/ForModelSheet/YousoGizyutu.pptx
@@ -4,6 +4,9 @@
   <p:sldMasterIdLst>
     <p:sldMasterId id="2147483648" r:id="rId1"/>
   </p:sldMasterIdLst>
+  <p:notesMasterIdLst>
+    <p:notesMasterId r:id="rId4"/>
+  </p:notesMasterIdLst>
   <p:sldIdLst>
     <p:sldId id="256" r:id="rId2"/>
     <p:sldId id="257" r:id="rId3"/>
@@ -1198,11 +1201,11 @@
           <c:showPercent val="0"/>
           <c:showBubbleSize val="0"/>
         </c:dLbls>
-        <c:axId val="43987456"/>
-        <c:axId val="43988032"/>
+        <c:axId val="79215232"/>
+        <c:axId val="79909248"/>
       </c:scatterChart>
       <c:valAx>
-        <c:axId val="43987456"/>
+        <c:axId val="79215232"/>
         <c:scaling>
           <c:orientation val="minMax"/>
         </c:scaling>
@@ -1211,12 +1214,12 @@
         <c:majorTickMark val="out"/>
         <c:minorTickMark val="none"/>
         <c:tickLblPos val="nextTo"/>
-        <c:crossAx val="43988032"/>
+        <c:crossAx val="79909248"/>
         <c:crosses val="autoZero"/>
         <c:crossBetween val="midCat"/>
       </c:valAx>
       <c:valAx>
-        <c:axId val="43988032"/>
+        <c:axId val="79909248"/>
         <c:scaling>
           <c:orientation val="minMax"/>
         </c:scaling>
@@ -1227,7 +1230,7 @@
         <c:majorTickMark val="out"/>
         <c:minorTickMark val="none"/>
         <c:tickLblPos val="nextTo"/>
-        <c:crossAx val="43987456"/>
+        <c:crossAx val="79215232"/>
         <c:crosses val="autoZero"/>
         <c:crossBetween val="midCat"/>
       </c:valAx>
@@ -1254,6 +1257,472 @@
     <c:autoUpdate val="0"/>
   </c:externalData>
 </c:chartSpace>
+</file>
+
+<file path=ppt/notesMasters/notesMaster1.xml><?xml version="1.0" encoding="utf-8"?>
+<p:notesMaster xmlns:a="http://schemas.openxmlformats.org/drawingml/2006/main" xmlns:r="http://schemas.openxmlformats.org/officeDocument/2006/relationships" xmlns:p="http://schemas.openxmlformats.org/presentationml/2006/main">
+  <p:cSld>
+    <p:bg>
+      <p:bgRef idx="1001">
+        <a:schemeClr val="bg1"/>
+      </p:bgRef>
+    </p:bg>
+    <p:spTree>
+      <p:nvGrpSpPr>
+        <p:cNvPr id="1" name=""/>
+        <p:cNvGrpSpPr/>
+        <p:nvPr/>
+      </p:nvGrpSpPr>
+      <p:grpSpPr>
+        <a:xfrm>
+          <a:off x="0" y="0"/>
+          <a:ext cx="0" cy="0"/>
+          <a:chOff x="0" y="0"/>
+          <a:chExt cx="0" cy="0"/>
+        </a:xfrm>
+      </p:grpSpPr>
+      <p:sp>
+        <p:nvSpPr>
+          <p:cNvPr id="2" name="ヘッダー プレースホルダー 1"/>
+          <p:cNvSpPr>
+            <a:spLocks noGrp="1"/>
+          </p:cNvSpPr>
+          <p:nvPr>
+            <p:ph type="hdr" sz="quarter"/>
+          </p:nvPr>
+        </p:nvSpPr>
+        <p:spPr>
+          <a:xfrm>
+            <a:off x="0" y="0"/>
+            <a:ext cx="2971800" cy="457200"/>
+          </a:xfrm>
+          <a:prstGeom prst="rect">
+            <a:avLst/>
+          </a:prstGeom>
+        </p:spPr>
+        <p:txBody>
+          <a:bodyPr vert="horz" lIns="91440" tIns="45720" rIns="91440" bIns="45720" rtlCol="0"/>
+          <a:lstStyle>
+            <a:lvl1pPr algn="l">
+              <a:defRPr sz="1200"/>
+            </a:lvl1pPr>
+          </a:lstStyle>
+          <a:p>
+            <a:endParaRPr kumimoji="1" lang="ja-JP" altLang="en-US"/>
+          </a:p>
+        </p:txBody>
+      </p:sp>
+      <p:sp>
+        <p:nvSpPr>
+          <p:cNvPr id="3" name="日付プレースホルダー 2"/>
+          <p:cNvSpPr>
+            <a:spLocks noGrp="1"/>
+          </p:cNvSpPr>
+          <p:nvPr>
+            <p:ph type="dt" idx="1"/>
+          </p:nvPr>
+        </p:nvSpPr>
+        <p:spPr>
+          <a:xfrm>
+            <a:off x="3884613" y="0"/>
+            <a:ext cx="2971800" cy="457200"/>
+          </a:xfrm>
+          <a:prstGeom prst="rect">
+            <a:avLst/>
+          </a:prstGeom>
+        </p:spPr>
+        <p:txBody>
+          <a:bodyPr vert="horz" lIns="91440" tIns="45720" rIns="91440" bIns="45720" rtlCol="0"/>
+          <a:lstStyle>
+            <a:lvl1pPr algn="r">
+              <a:defRPr sz="1200"/>
+            </a:lvl1pPr>
+          </a:lstStyle>
+          <a:p>
+            <a:fld id="{E619483D-EE48-47B9-922B-B39AF890B10F}" type="datetimeFigureOut">
+              <a:rPr kumimoji="1" lang="ja-JP" altLang="en-US" smtClean="0"/>
+              <a:t>2012/9/5</a:t>
+            </a:fld>
+            <a:endParaRPr kumimoji="1" lang="ja-JP" altLang="en-US"/>
+          </a:p>
+        </p:txBody>
+      </p:sp>
+      <p:sp>
+        <p:nvSpPr>
+          <p:cNvPr id="4" name="スライド イメージ プレースホルダー 3"/>
+          <p:cNvSpPr>
+            <a:spLocks noGrp="1" noRot="1" noChangeAspect="1"/>
+          </p:cNvSpPr>
+          <p:nvPr>
+            <p:ph type="sldImg" idx="2"/>
+          </p:nvPr>
+        </p:nvSpPr>
+        <p:spPr>
+          <a:xfrm>
+            <a:off x="1143000" y="685800"/>
+            <a:ext cx="4572000" cy="3429000"/>
+          </a:xfrm>
+          <a:prstGeom prst="rect">
+            <a:avLst/>
+          </a:prstGeom>
+          <a:noFill/>
+          <a:ln w="12700">
+            <a:solidFill>
+              <a:prstClr val="black"/>
+            </a:solidFill>
+          </a:ln>
+        </p:spPr>
+        <p:txBody>
+          <a:bodyPr vert="horz" lIns="91440" tIns="45720" rIns="91440" bIns="45720" rtlCol="0" anchor="ctr"/>
+          <a:lstStyle/>
+          <a:p>
+            <a:endParaRPr lang="ja-JP" altLang="en-US"/>
+          </a:p>
+        </p:txBody>
+      </p:sp>
+      <p:sp>
+        <p:nvSpPr>
+          <p:cNvPr id="5" name="ノート プレースホルダー 4"/>
+          <p:cNvSpPr>
+            <a:spLocks noGrp="1"/>
+          </p:cNvSpPr>
+          <p:nvPr>
+            <p:ph type="body" sz="quarter" idx="3"/>
+          </p:nvPr>
+        </p:nvSpPr>
+        <p:spPr>
+          <a:xfrm>
+            <a:off x="685800" y="4343400"/>
+            <a:ext cx="5486400" cy="4114800"/>
+          </a:xfrm>
+          <a:prstGeom prst="rect">
+            <a:avLst/>
+          </a:prstGeom>
+        </p:spPr>
+        <p:txBody>
+          <a:bodyPr vert="horz" lIns="91440" tIns="45720" rIns="91440" bIns="45720" rtlCol="0"/>
+          <a:lstStyle/>
+          <a:p>
+            <a:pPr lvl="0"/>
+            <a:r>
+              <a:rPr kumimoji="1" lang="ja-JP" altLang="en-US" smtClean="0"/>
+              <a:t>マスター テキストの書式設定</a:t>
+            </a:r>
+          </a:p>
+          <a:p>
+            <a:pPr lvl="1"/>
+            <a:r>
+              <a:rPr kumimoji="1" lang="ja-JP" altLang="en-US" smtClean="0"/>
+              <a:t>第 </a:t>
+            </a:r>
+            <a:r>
+              <a:rPr kumimoji="1" lang="en-US" altLang="ja-JP" smtClean="0"/>
+              <a:t>2 </a:t>
+            </a:r>
+            <a:r>
+              <a:rPr kumimoji="1" lang="ja-JP" altLang="en-US" smtClean="0"/>
+              <a:t>レベル</a:t>
+            </a:r>
+          </a:p>
+          <a:p>
+            <a:pPr lvl="2"/>
+            <a:r>
+              <a:rPr kumimoji="1" lang="ja-JP" altLang="en-US" smtClean="0"/>
+              <a:t>第 </a:t>
+            </a:r>
+            <a:r>
+              <a:rPr kumimoji="1" lang="en-US" altLang="ja-JP" smtClean="0"/>
+              <a:t>3 </a:t>
+            </a:r>
+            <a:r>
+              <a:rPr kumimoji="1" lang="ja-JP" altLang="en-US" smtClean="0"/>
+              <a:t>レベル</a:t>
+            </a:r>
+          </a:p>
+          <a:p>
+            <a:pPr lvl="3"/>
+            <a:r>
+              <a:rPr kumimoji="1" lang="ja-JP" altLang="en-US" smtClean="0"/>
+              <a:t>第 </a:t>
+            </a:r>
+            <a:r>
+              <a:rPr kumimoji="1" lang="en-US" altLang="ja-JP" smtClean="0"/>
+              <a:t>4 </a:t>
+            </a:r>
+            <a:r>
+              <a:rPr kumimoji="1" lang="ja-JP" altLang="en-US" smtClean="0"/>
+              <a:t>レベル</a:t>
+            </a:r>
+          </a:p>
+          <a:p>
+            <a:pPr lvl="4"/>
+            <a:r>
+              <a:rPr kumimoji="1" lang="ja-JP" altLang="en-US" smtClean="0"/>
+              <a:t>第 </a:t>
+            </a:r>
+            <a:r>
+              <a:rPr kumimoji="1" lang="en-US" altLang="ja-JP" smtClean="0"/>
+              <a:t>5 </a:t>
+            </a:r>
+            <a:r>
+              <a:rPr kumimoji="1" lang="ja-JP" altLang="en-US" smtClean="0"/>
+              <a:t>レベル</a:t>
+            </a:r>
+            <a:endParaRPr kumimoji="1" lang="ja-JP" altLang="en-US"/>
+          </a:p>
+        </p:txBody>
+      </p:sp>
+      <p:sp>
+        <p:nvSpPr>
+          <p:cNvPr id="6" name="フッター プレースホルダー 5"/>
+          <p:cNvSpPr>
+            <a:spLocks noGrp="1"/>
+          </p:cNvSpPr>
+          <p:nvPr>
+            <p:ph type="ftr" sz="quarter" idx="4"/>
+          </p:nvPr>
+        </p:nvSpPr>
+        <p:spPr>
+          <a:xfrm>
+            <a:off x="0" y="8685213"/>
+            <a:ext cx="2971800" cy="457200"/>
+          </a:xfrm>
+          <a:prstGeom prst="rect">
+            <a:avLst/>
+          </a:prstGeom>
+        </p:spPr>
+        <p:txBody>
+          <a:bodyPr vert="horz" lIns="91440" tIns="45720" rIns="91440" bIns="45720" rtlCol="0" anchor="b"/>
+          <a:lstStyle>
+            <a:lvl1pPr algn="l">
+              <a:defRPr sz="1200"/>
+            </a:lvl1pPr>
+          </a:lstStyle>
+          <a:p>
+            <a:endParaRPr kumimoji="1" lang="ja-JP" altLang="en-US"/>
+          </a:p>
+        </p:txBody>
+      </p:sp>
+      <p:sp>
+        <p:nvSpPr>
+          <p:cNvPr id="7" name="スライド番号プレースホルダー 6"/>
+          <p:cNvSpPr>
+            <a:spLocks noGrp="1"/>
+          </p:cNvSpPr>
+          <p:nvPr>
+            <p:ph type="sldNum" sz="quarter" idx="5"/>
+          </p:nvPr>
+        </p:nvSpPr>
+        <p:spPr>
+          <a:xfrm>
+            <a:off x="3884613" y="8685213"/>
+            <a:ext cx="2971800" cy="457200"/>
+          </a:xfrm>
+          <a:prstGeom prst="rect">
+            <a:avLst/>
+          </a:prstGeom>
+        </p:spPr>
+        <p:txBody>
+          <a:bodyPr vert="horz" lIns="91440" tIns="45720" rIns="91440" bIns="45720" rtlCol="0" anchor="b"/>
+          <a:lstStyle>
+            <a:lvl1pPr algn="r">
+              <a:defRPr sz="1200"/>
+            </a:lvl1pPr>
+          </a:lstStyle>
+          <a:p>
+            <a:fld id="{25D0922C-C0E5-4BCC-A3FF-B19823A6A3DF}" type="slidenum">
+              <a:rPr kumimoji="1" lang="ja-JP" altLang="en-US" smtClean="0"/>
+              <a:t>‹#›</a:t>
+            </a:fld>
+            <a:endParaRPr kumimoji="1" lang="ja-JP" altLang="en-US"/>
+          </a:p>
+        </p:txBody>
+      </p:sp>
+    </p:spTree>
+    <p:extLst>
+      <p:ext uri="{BB962C8B-B14F-4D97-AF65-F5344CB8AC3E}">
+        <p14:creationId xmlns:p14="http://schemas.microsoft.com/office/powerpoint/2010/main" val="3175141414"/>
+      </p:ext>
+    </p:extLst>
+  </p:cSld>
+  <p:clrMap bg1="lt1" tx1="dk1" bg2="lt2" tx2="dk2" accent1="accent1" accent2="accent2" accent3="accent3" accent4="accent4" accent5="accent5" accent6="accent6" hlink="hlink" folHlink="folHlink"/>
+  <p:notesStyle>
+    <a:lvl1pPr marL="0" algn="l" defTabSz="914400" rtl="0" eaLnBrk="1" latinLnBrk="0" hangingPunct="1">
+      <a:defRPr kumimoji="1" sz="1200" kern="1200">
+        <a:solidFill>
+          <a:schemeClr val="tx1"/>
+        </a:solidFill>
+        <a:latin typeface="+mn-lt"/>
+        <a:ea typeface="+mn-ea"/>
+        <a:cs typeface="+mn-cs"/>
+      </a:defRPr>
+    </a:lvl1pPr>
+    <a:lvl2pPr marL="457200" algn="l" defTabSz="914400" rtl="0" eaLnBrk="1" latinLnBrk="0" hangingPunct="1">
+      <a:defRPr kumimoji="1" sz="1200" kern="1200">
+        <a:solidFill>
+          <a:schemeClr val="tx1"/>
+        </a:solidFill>
+        <a:latin typeface="+mn-lt"/>
+        <a:ea typeface="+mn-ea"/>
+        <a:cs typeface="+mn-cs"/>
+      </a:defRPr>
+    </a:lvl2pPr>
+    <a:lvl3pPr marL="914400" algn="l" defTabSz="914400" rtl="0" eaLnBrk="1" latinLnBrk="0" hangingPunct="1">
+      <a:defRPr kumimoji="1" sz="1200" kern="1200">
+        <a:solidFill>
+          <a:schemeClr val="tx1"/>
+        </a:solidFill>
+        <a:latin typeface="+mn-lt"/>
+        <a:ea typeface="+mn-ea"/>
+        <a:cs typeface="+mn-cs"/>
+      </a:defRPr>
+    </a:lvl3pPr>
+    <a:lvl4pPr marL="1371600" algn="l" defTabSz="914400" rtl="0" eaLnBrk="1" latinLnBrk="0" hangingPunct="1">
+      <a:defRPr kumimoji="1" sz="1200" kern="1200">
+        <a:solidFill>
+          <a:schemeClr val="tx1"/>
+        </a:solidFill>
+        <a:latin typeface="+mn-lt"/>
+        <a:ea typeface="+mn-ea"/>
+        <a:cs typeface="+mn-cs"/>
+      </a:defRPr>
+    </a:lvl4pPr>
+    <a:lvl5pPr marL="1828800" algn="l" defTabSz="914400" rtl="0" eaLnBrk="1" latinLnBrk="0" hangingPunct="1">
+      <a:defRPr kumimoji="1" sz="1200" kern="1200">
+        <a:solidFill>
+          <a:schemeClr val="tx1"/>
+        </a:solidFill>
+        <a:latin typeface="+mn-lt"/>
+        <a:ea typeface="+mn-ea"/>
+        <a:cs typeface="+mn-cs"/>
+      </a:defRPr>
+    </a:lvl5pPr>
+    <a:lvl6pPr marL="2286000" algn="l" defTabSz="914400" rtl="0" eaLnBrk="1" latinLnBrk="0" hangingPunct="1">
+      <a:defRPr kumimoji="1" sz="1200" kern="1200">
+        <a:solidFill>
+          <a:schemeClr val="tx1"/>
+        </a:solidFill>
+        <a:latin typeface="+mn-lt"/>
+        <a:ea typeface="+mn-ea"/>
+        <a:cs typeface="+mn-cs"/>
+      </a:defRPr>
+    </a:lvl6pPr>
+    <a:lvl7pPr marL="2743200" algn="l" defTabSz="914400" rtl="0" eaLnBrk="1" latinLnBrk="0" hangingPunct="1">
+      <a:defRPr kumimoji="1" sz="1200" kern="1200">
+        <a:solidFill>
+          <a:schemeClr val="tx1"/>
+        </a:solidFill>
+        <a:latin typeface="+mn-lt"/>
+        <a:ea typeface="+mn-ea"/>
+        <a:cs typeface="+mn-cs"/>
+      </a:defRPr>
+    </a:lvl7pPr>
+    <a:lvl8pPr marL="3200400" algn="l" defTabSz="914400" rtl="0" eaLnBrk="1" latinLnBrk="0" hangingPunct="1">
+      <a:defRPr kumimoji="1" sz="1200" kern="1200">
+        <a:solidFill>
+          <a:schemeClr val="tx1"/>
+        </a:solidFill>
+        <a:latin typeface="+mn-lt"/>
+        <a:ea typeface="+mn-ea"/>
+        <a:cs typeface="+mn-cs"/>
+      </a:defRPr>
+    </a:lvl8pPr>
+    <a:lvl9pPr marL="3657600" algn="l" defTabSz="914400" rtl="0" eaLnBrk="1" latinLnBrk="0" hangingPunct="1">
+      <a:defRPr kumimoji="1" sz="1200" kern="1200">
+        <a:solidFill>
+          <a:schemeClr val="tx1"/>
+        </a:solidFill>
+        <a:latin typeface="+mn-lt"/>
+        <a:ea typeface="+mn-ea"/>
+        <a:cs typeface="+mn-cs"/>
+      </a:defRPr>
+    </a:lvl9pPr>
+  </p:notesStyle>
+</p:notesMaster>
+</file>
+
+<file path=ppt/notesSlides/notesSlide1.xml><?xml version="1.0" encoding="utf-8"?>
+<p:notes xmlns:a="http://schemas.openxmlformats.org/drawingml/2006/main" xmlns:r="http://schemas.openxmlformats.org/officeDocument/2006/relationships" xmlns:p="http://schemas.openxmlformats.org/presentationml/2006/main">
+  <p:cSld>
+    <p:spTree>
+      <p:nvGrpSpPr>
+        <p:cNvPr id="1" name=""/>
+        <p:cNvGrpSpPr/>
+        <p:nvPr/>
+      </p:nvGrpSpPr>
+      <p:grpSpPr>
+        <a:xfrm>
+          <a:off x="0" y="0"/>
+          <a:ext cx="0" cy="0"/>
+          <a:chOff x="0" y="0"/>
+          <a:chExt cx="0" cy="0"/>
+        </a:xfrm>
+      </p:grpSpPr>
+      <p:sp>
+        <p:nvSpPr>
+          <p:cNvPr id="2" name="スライド イメージ プレースホルダー 1"/>
+          <p:cNvSpPr>
+            <a:spLocks noGrp="1" noRot="1" noChangeAspect="1"/>
+          </p:cNvSpPr>
+          <p:nvPr>
+            <p:ph type="sldImg"/>
+          </p:nvPr>
+        </p:nvSpPr>
+        <p:spPr/>
+      </p:sp>
+      <p:sp>
+        <p:nvSpPr>
+          <p:cNvPr id="3" name="ノート プレースホルダー 2"/>
+          <p:cNvSpPr>
+            <a:spLocks noGrp="1"/>
+          </p:cNvSpPr>
+          <p:nvPr>
+            <p:ph type="body" idx="1"/>
+          </p:nvPr>
+        </p:nvSpPr>
+        <p:spPr/>
+        <p:txBody>
+          <a:bodyPr/>
+          <a:lstStyle/>
+          <a:p>
+            <a:endParaRPr kumimoji="1" lang="ja-JP" altLang="en-US" dirty="0"/>
+          </a:p>
+        </p:txBody>
+      </p:sp>
+      <p:sp>
+        <p:nvSpPr>
+          <p:cNvPr id="4" name="スライド番号プレースホルダー 3"/>
+          <p:cNvSpPr>
+            <a:spLocks noGrp="1"/>
+          </p:cNvSpPr>
+          <p:nvPr>
+            <p:ph type="sldNum" sz="quarter" idx="10"/>
+          </p:nvPr>
+        </p:nvSpPr>
+        <p:spPr/>
+        <p:txBody>
+          <a:bodyPr/>
+          <a:lstStyle/>
+          <a:p>
+            <a:fld id="{25D0922C-C0E5-4BCC-A3FF-B19823A6A3DF}" type="slidenum">
+              <a:rPr kumimoji="1" lang="ja-JP" altLang="en-US" smtClean="0"/>
+              <a:t>2</a:t>
+            </a:fld>
+            <a:endParaRPr kumimoji="1" lang="ja-JP" altLang="en-US"/>
+          </a:p>
+        </p:txBody>
+      </p:sp>
+    </p:spTree>
+    <p:extLst>
+      <p:ext uri="{BB962C8B-B14F-4D97-AF65-F5344CB8AC3E}">
+        <p14:creationId xmlns:p14="http://schemas.microsoft.com/office/powerpoint/2010/main" val="3278784189"/>
+      </p:ext>
+    </p:extLst>
+  </p:cSld>
+  <p:clrMapOvr>
+    <a:masterClrMapping/>
+  </p:clrMapOvr>
+</p:notes>
 </file>
 
 <file path=ppt/slideLayouts/slideLayout1.xml><?xml version="1.0" encoding="utf-8"?>
@@ -4616,7 +5085,7 @@
           <p:nvPr/>
         </p:nvPicPr>
         <p:blipFill>
-          <a:blip r:embed="rId2">
+          <a:blip r:embed="rId3">
             <a:extLst>
               <a:ext uri="{28A0092B-C50C-407E-A947-70E740481C1C}">
                 <a14:useLocalDpi xmlns:a14="http://schemas.microsoft.com/office/drawing/2010/main" val="0"/>
@@ -4865,15 +5334,7 @@
                 <a:ea typeface="メイリオ" pitchFamily="50" charset="-128"/>
                 <a:cs typeface="メイリオ" pitchFamily="50" charset="-128"/>
               </a:rPr>
-              <a:t>の値を入力することができる。よって旋回量の算出をこの範囲で行うことで、さらなる走行スピードの向上が可能となる</a:t>
-            </a:r>
-            <a:r>
-              <a:rPr lang="ja-JP" altLang="en-US" sz="1200" dirty="0" smtClean="0">
-                <a:latin typeface="メイリオ" pitchFamily="50" charset="-128"/>
-                <a:ea typeface="メイリオ" pitchFamily="50" charset="-128"/>
-                <a:cs typeface="メイリオ" pitchFamily="50" charset="-128"/>
-              </a:rPr>
-              <a:t>。</a:t>
+              <a:t>の値を入力することができる。よって旋回量の算出をこの範囲で行うことで、さらなる走行スピードの向上が可能となる。</a:t>
             </a:r>
             <a:endParaRPr kumimoji="1" lang="ja-JP" altLang="en-US" sz="1200" dirty="0">
               <a:latin typeface="メイリオ" pitchFamily="50" charset="-128"/>
@@ -5044,7 +5505,31 @@
                 <a:ea typeface="メイリオ" pitchFamily="50" charset="-128"/>
                 <a:cs typeface="メイリオ" pitchFamily="50" charset="-128"/>
               </a:rPr>
-              <a:t>値が規定量を超えたら、それを反対側のモータの制御量に反映させることで高速走行における旋回制御を実現している。</a:t>
+              <a:t>値が規定量を超えたら、それを反対側のモータの制御量に反映させることで高速走行に</a:t>
+            </a:r>
+            <a:r>
+              <a:rPr lang="ja-JP" altLang="en-US" sz="1200" dirty="0" smtClean="0">
+                <a:latin typeface="メイリオ" pitchFamily="50" charset="-128"/>
+                <a:ea typeface="メイリオ" pitchFamily="50" charset="-128"/>
+                <a:cs typeface="メイリオ" pitchFamily="50" charset="-128"/>
+              </a:rPr>
+              <a:t>おける</a:t>
+            </a:r>
+            <a:r>
+              <a:rPr lang="ja-JP" altLang="en-US" sz="1200" dirty="0">
+                <a:latin typeface="メイリオ" pitchFamily="50" charset="-128"/>
+                <a:ea typeface="メイリオ" pitchFamily="50" charset="-128"/>
+                <a:cs typeface="メイリオ" pitchFamily="50" charset="-128"/>
+              </a:rPr>
+              <a:t>正確</a:t>
+            </a:r>
+            <a:r>
+              <a:rPr lang="ja-JP" altLang="en-US" sz="1200" dirty="0" smtClean="0">
+                <a:latin typeface="メイリオ" pitchFamily="50" charset="-128"/>
+                <a:ea typeface="メイリオ" pitchFamily="50" charset="-128"/>
+                <a:cs typeface="メイリオ" pitchFamily="50" charset="-128"/>
+              </a:rPr>
+              <a:t>な旋回を実現している。</a:t>
             </a:r>
             <a:endParaRPr kumimoji="1" lang="ja-JP" altLang="en-US" sz="1200" dirty="0">
               <a:latin typeface="メイリオ" pitchFamily="50" charset="-128"/>
@@ -6506,90 +6991,6 @@
       </p:sp>
       <p:sp>
         <p:nvSpPr>
-          <p:cNvPr id="84" name="正方形/長方形 83"/>
-          <p:cNvSpPr/>
-          <p:nvPr/>
-        </p:nvSpPr>
-        <p:spPr>
-          <a:xfrm>
-            <a:off x="7336818" y="7852708"/>
-            <a:ext cx="432048" cy="164366"/>
-          </a:xfrm>
-          <a:prstGeom prst="rect">
-            <a:avLst/>
-          </a:prstGeom>
-          <a:solidFill>
-            <a:srgbClr val="FF0000"/>
-          </a:solidFill>
-          <a:ln/>
-        </p:spPr>
-        <p:style>
-          <a:lnRef idx="0">
-            <a:schemeClr val="accent6"/>
-          </a:lnRef>
-          <a:fillRef idx="3">
-            <a:schemeClr val="accent6"/>
-          </a:fillRef>
-          <a:effectRef idx="3">
-            <a:schemeClr val="accent6"/>
-          </a:effectRef>
-          <a:fontRef idx="minor">
-            <a:schemeClr val="lt1"/>
-          </a:fontRef>
-        </p:style>
-        <p:txBody>
-          <a:bodyPr rtlCol="0" anchor="ctr"/>
-          <a:lstStyle/>
-          <a:p>
-            <a:pPr algn="ctr"/>
-            <a:endParaRPr kumimoji="1" lang="ja-JP" altLang="en-US"/>
-          </a:p>
-        </p:txBody>
-      </p:sp>
-      <p:sp>
-        <p:nvSpPr>
-          <p:cNvPr id="85" name="正方形/長方形 84"/>
-          <p:cNvSpPr/>
-          <p:nvPr/>
-        </p:nvSpPr>
-        <p:spPr>
-          <a:xfrm>
-            <a:off x="7336818" y="8008296"/>
-            <a:ext cx="432048" cy="164366"/>
-          </a:xfrm>
-          <a:prstGeom prst="rect">
-            <a:avLst/>
-          </a:prstGeom>
-          <a:solidFill>
-            <a:srgbClr val="FF0000"/>
-          </a:solidFill>
-          <a:ln/>
-        </p:spPr>
-        <p:style>
-          <a:lnRef idx="0">
-            <a:schemeClr val="accent6"/>
-          </a:lnRef>
-          <a:fillRef idx="3">
-            <a:schemeClr val="accent6"/>
-          </a:fillRef>
-          <a:effectRef idx="3">
-            <a:schemeClr val="accent6"/>
-          </a:effectRef>
-          <a:fontRef idx="minor">
-            <a:schemeClr val="lt1"/>
-          </a:fontRef>
-        </p:style>
-        <p:txBody>
-          <a:bodyPr rtlCol="0" anchor="ctr"/>
-          <a:lstStyle/>
-          <a:p>
-            <a:pPr algn="ctr"/>
-            <a:endParaRPr kumimoji="1" lang="ja-JP" altLang="en-US"/>
-          </a:p>
-        </p:txBody>
-      </p:sp>
-      <p:sp>
-        <p:nvSpPr>
           <p:cNvPr id="86" name="正方形/長方形 85"/>
           <p:cNvSpPr/>
           <p:nvPr/>
@@ -6953,7 +7354,7 @@
         </p:nvSpPr>
         <p:spPr>
           <a:xfrm>
-            <a:off x="6482728" y="6422554"/>
+            <a:off x="6105807" y="6340371"/>
             <a:ext cx="818086" cy="430887"/>
           </a:xfrm>
           <a:prstGeom prst="rect">
@@ -6990,8 +7391,8 @@
           <p:nvPr/>
         </p:nvSpPr>
         <p:spPr>
-          <a:xfrm rot="19769806">
-            <a:off x="6564094" y="6798685"/>
+          <a:xfrm rot="16200000">
+            <a:off x="6452990" y="6742289"/>
             <a:ext cx="150164" cy="214653"/>
           </a:xfrm>
           <a:prstGeom prst="downArrow">
@@ -7029,8 +7430,8 @@
         </p:nvSpPr>
         <p:spPr>
           <a:xfrm>
-            <a:off x="7368471" y="7222555"/>
-            <a:ext cx="974790" cy="430887"/>
+            <a:off x="7594176" y="6983690"/>
+            <a:ext cx="795780" cy="600164"/>
           </a:xfrm>
           <a:prstGeom prst="rect">
             <a:avLst/>
@@ -7067,7 +7468,7 @@
         </p:nvSpPr>
         <p:spPr>
           <a:xfrm rot="2394140">
-            <a:off x="7705678" y="7587361"/>
+            <a:off x="7894145" y="7498218"/>
             <a:ext cx="150164" cy="214653"/>
           </a:xfrm>
           <a:prstGeom prst="downArrow">
@@ -7117,7 +7518,7 @@
         </p:xfrm>
         <a:graphic>
           <a:graphicData uri="http://schemas.openxmlformats.org/drawingml/2006/chart">
-            <c:chart xmlns:c="http://schemas.openxmlformats.org/drawingml/2006/chart" xmlns:r="http://schemas.openxmlformats.org/officeDocument/2006/relationships" r:id="rId3"/>
+            <c:chart xmlns:c="http://schemas.openxmlformats.org/drawingml/2006/chart" xmlns:r="http://schemas.openxmlformats.org/officeDocument/2006/relationships" r:id="rId4"/>
           </a:graphicData>
         </a:graphic>
       </p:graphicFrame>
@@ -7206,7 +7607,7 @@
         <p:spPr>
           <a:xfrm>
             <a:off x="8691541" y="4919422"/>
-            <a:ext cx="3862308" cy="1754326"/>
+            <a:ext cx="3862308" cy="1461939"/>
           </a:xfrm>
           <a:prstGeom prst="rect">
             <a:avLst/>
@@ -7228,15 +7629,31 @@
               <a:t>　</a:t>
             </a:r>
             <a:r>
-              <a:rPr lang="ja-JP" altLang="en-US" sz="1200" dirty="0" smtClean="0">
+              <a:rPr lang="ja-JP" altLang="en-US" sz="1100" dirty="0" smtClean="0">
                 <a:latin typeface="メイリオ" pitchFamily="50" charset="-128"/>
                 <a:ea typeface="メイリオ" pitchFamily="50" charset="-128"/>
                 <a:cs typeface="メイリオ" pitchFamily="50" charset="-128"/>
               </a:rPr>
-              <a:t>階段やシーソをクリア後、段差を降りる衝撃で走行体の姿勢が崩れ、多くラインを見失ってしまうケースが多く見られる。そこで、ラインを再び見つけライントレースを再開する必要がある。そこで、</a:t>
-            </a:r>
-            <a:r>
-              <a:rPr lang="ja-JP" altLang="en-US" sz="1200" dirty="0">
+              <a:t>階段やシーソをクリア後、段差を降りる衝撃で走行体の姿勢が崩れ</a:t>
+            </a:r>
+            <a:r>
+              <a:rPr lang="ja-JP" altLang="en-US" sz="1100" dirty="0" smtClean="0">
+                <a:latin typeface="メイリオ" pitchFamily="50" charset="-128"/>
+                <a:ea typeface="メイリオ" pitchFamily="50" charset="-128"/>
+                <a:cs typeface="メイリオ" pitchFamily="50" charset="-128"/>
+              </a:rPr>
+              <a:t>、ライン</a:t>
+            </a:r>
+            <a:r>
+              <a:rPr lang="ja-JP" altLang="en-US" sz="1100" dirty="0" smtClean="0">
+                <a:latin typeface="メイリオ" pitchFamily="50" charset="-128"/>
+                <a:ea typeface="メイリオ" pitchFamily="50" charset="-128"/>
+                <a:cs typeface="メイリオ" pitchFamily="50" charset="-128"/>
+              </a:rPr>
+              <a:t>を見失ってしまうケースが多く見られる。そこで、ラインを再び見つけライントレースを再開する必要がある。そこで、</a:t>
+            </a:r>
+            <a:r>
+              <a:rPr lang="ja-JP" altLang="en-US" sz="1100" dirty="0">
                 <a:latin typeface="メイリオ" pitchFamily="50" charset="-128"/>
                 <a:ea typeface="メイリオ" pitchFamily="50" charset="-128"/>
                 <a:cs typeface="メイリオ" pitchFamily="50" charset="-128"/>
@@ -7244,14 +7661,14 @@
               <a:t>しかし、難所クリア直後の走行</a:t>
             </a:r>
             <a:r>
-              <a:rPr lang="ja-JP" altLang="en-US" sz="1200" dirty="0" smtClean="0">
+              <a:rPr lang="ja-JP" altLang="en-US" sz="1100" dirty="0" smtClean="0">
                 <a:latin typeface="メイリオ" pitchFamily="50" charset="-128"/>
                 <a:ea typeface="メイリオ" pitchFamily="50" charset="-128"/>
                 <a:cs typeface="メイリオ" pitchFamily="50" charset="-128"/>
               </a:rPr>
               <a:t>ログから自分がラインからどちら側にどれだけ離れているかを識別するのは誤差が多く入り込む危険性がある。そこで、ラインの左右どちらに外れてしまっても復帰できるようにすることが必要であると考えた。</a:t>
             </a:r>
-            <a:endParaRPr kumimoji="1" lang="ja-JP" altLang="en-US" sz="1200" dirty="0">
+            <a:endParaRPr kumimoji="1" lang="ja-JP" altLang="en-US" sz="1100" dirty="0">
               <a:latin typeface="メイリオ" pitchFamily="50" charset="-128"/>
               <a:ea typeface="メイリオ" pitchFamily="50" charset="-128"/>
               <a:cs typeface="メイリオ" pitchFamily="50" charset="-128"/>
@@ -7354,7 +7771,7 @@
           <p:nvPr/>
         </p:nvPicPr>
         <p:blipFill>
-          <a:blip r:embed="rId2">
+          <a:blip r:embed="rId3">
             <a:extLst>
               <a:ext uri="{28A0092B-C50C-407E-A947-70E740481C1C}">
                 <a14:useLocalDpi xmlns:a14="http://schemas.microsoft.com/office/drawing/2010/main" val="0"/>
@@ -8152,8 +8569,8 @@
         </p:nvSpPr>
         <p:spPr>
           <a:xfrm>
-            <a:off x="9009125" y="6592362"/>
-            <a:ext cx="1594707" cy="261610"/>
+            <a:off x="8873334" y="6592362"/>
+            <a:ext cx="1813977" cy="261610"/>
           </a:xfrm>
           <a:prstGeom prst="rect">
             <a:avLst/>
@@ -8172,7 +8589,23 @@
                 <a:ea typeface="メイリオ" pitchFamily="50" charset="-128"/>
                 <a:cs typeface="メイリオ" pitchFamily="50" charset="-128"/>
               </a:rPr>
-              <a:t>ライン左に落ちた場合</a:t>
+              <a:t>ライン</a:t>
+            </a:r>
+            <a:r>
+              <a:rPr lang="ja-JP" altLang="en-US" sz="1100" b="1" dirty="0" smtClean="0">
+                <a:latin typeface="メイリオ" pitchFamily="50" charset="-128"/>
+                <a:ea typeface="メイリオ" pitchFamily="50" charset="-128"/>
+                <a:cs typeface="メイリオ" pitchFamily="50" charset="-128"/>
+              </a:rPr>
+              <a:t>左側に</a:t>
+            </a:r>
+            <a:r>
+              <a:rPr lang="ja-JP" altLang="en-US" sz="1100" b="1" dirty="0" smtClean="0">
+                <a:latin typeface="メイリオ" pitchFamily="50" charset="-128"/>
+                <a:ea typeface="メイリオ" pitchFamily="50" charset="-128"/>
+                <a:cs typeface="メイリオ" pitchFamily="50" charset="-128"/>
+              </a:rPr>
+              <a:t>落ちた場合</a:t>
             </a:r>
             <a:endParaRPr kumimoji="1" lang="ja-JP" altLang="en-US" sz="1100" b="1" dirty="0">
               <a:latin typeface="メイリオ" pitchFamily="50" charset="-128"/>
@@ -8191,7 +8624,7 @@
         <p:spPr>
           <a:xfrm>
             <a:off x="10638444" y="6584891"/>
-            <a:ext cx="1594707" cy="261610"/>
+            <a:ext cx="1739020" cy="261610"/>
           </a:xfrm>
           <a:prstGeom prst="rect">
             <a:avLst/>
@@ -8210,13 +8643,321 @@
                 <a:ea typeface="メイリオ" pitchFamily="50" charset="-128"/>
                 <a:cs typeface="メイリオ" pitchFamily="50" charset="-128"/>
               </a:rPr>
-              <a:t>ライン右に落ちた場合</a:t>
+              <a:t>ライン</a:t>
+            </a:r>
+            <a:r>
+              <a:rPr lang="ja-JP" altLang="en-US" sz="1100" b="1" dirty="0" smtClean="0">
+                <a:latin typeface="メイリオ" pitchFamily="50" charset="-128"/>
+                <a:ea typeface="メイリオ" pitchFamily="50" charset="-128"/>
+                <a:cs typeface="メイリオ" pitchFamily="50" charset="-128"/>
+              </a:rPr>
+              <a:t>右側に</a:t>
+            </a:r>
+            <a:r>
+              <a:rPr lang="ja-JP" altLang="en-US" sz="1100" b="1" dirty="0" smtClean="0">
+                <a:latin typeface="メイリオ" pitchFamily="50" charset="-128"/>
+                <a:ea typeface="メイリオ" pitchFamily="50" charset="-128"/>
+                <a:cs typeface="メイリオ" pitchFamily="50" charset="-128"/>
+              </a:rPr>
+              <a:t>落ちた場合</a:t>
             </a:r>
             <a:endParaRPr kumimoji="1" lang="ja-JP" altLang="en-US" sz="1100" b="1" dirty="0">
               <a:latin typeface="メイリオ" pitchFamily="50" charset="-128"/>
               <a:ea typeface="メイリオ" pitchFamily="50" charset="-128"/>
               <a:cs typeface="メイリオ" pitchFamily="50" charset="-128"/>
             </a:endParaRPr>
+          </a:p>
+        </p:txBody>
+      </p:sp>
+      <p:sp>
+        <p:nvSpPr>
+          <p:cNvPr id="3" name="右矢印 2"/>
+          <p:cNvSpPr/>
+          <p:nvPr/>
+        </p:nvSpPr>
+        <p:spPr>
+          <a:xfrm>
+            <a:off x="6055693" y="7321948"/>
+            <a:ext cx="493094" cy="290556"/>
+          </a:xfrm>
+          <a:prstGeom prst="rightArrow">
+            <a:avLst/>
+          </a:prstGeom>
+        </p:spPr>
+        <p:style>
+          <a:lnRef idx="1">
+            <a:schemeClr val="accent2"/>
+          </a:lnRef>
+          <a:fillRef idx="3">
+            <a:schemeClr val="accent2"/>
+          </a:fillRef>
+          <a:effectRef idx="2">
+            <a:schemeClr val="accent2"/>
+          </a:effectRef>
+          <a:fontRef idx="minor">
+            <a:schemeClr val="lt1"/>
+          </a:fontRef>
+        </p:style>
+        <p:txBody>
+          <a:bodyPr rtlCol="0" anchor="ctr"/>
+          <a:lstStyle/>
+          <a:p>
+            <a:pPr algn="ctr"/>
+            <a:endParaRPr kumimoji="1" lang="ja-JP" altLang="en-US"/>
+          </a:p>
+        </p:txBody>
+      </p:sp>
+      <p:sp>
+        <p:nvSpPr>
+          <p:cNvPr id="89" name="正方形/長方形 88"/>
+          <p:cNvSpPr/>
+          <p:nvPr/>
+        </p:nvSpPr>
+        <p:spPr>
+          <a:xfrm>
+            <a:off x="7336818" y="7660820"/>
+            <a:ext cx="432048" cy="164366"/>
+          </a:xfrm>
+          <a:prstGeom prst="rect">
+            <a:avLst/>
+          </a:prstGeom>
+          <a:noFill/>
+          <a:ln>
+            <a:solidFill>
+              <a:schemeClr val="accent6"/>
+            </a:solidFill>
+          </a:ln>
+        </p:spPr>
+        <p:style>
+          <a:lnRef idx="0">
+            <a:schemeClr val="accent6"/>
+          </a:lnRef>
+          <a:fillRef idx="3">
+            <a:schemeClr val="accent6"/>
+          </a:fillRef>
+          <a:effectRef idx="3">
+            <a:schemeClr val="accent6"/>
+          </a:effectRef>
+          <a:fontRef idx="minor">
+            <a:schemeClr val="lt1"/>
+          </a:fontRef>
+        </p:style>
+        <p:txBody>
+          <a:bodyPr rtlCol="0" anchor="ctr"/>
+          <a:lstStyle/>
+          <a:p>
+            <a:pPr algn="ctr"/>
+            <a:endParaRPr kumimoji="1" lang="ja-JP" altLang="en-US"/>
+          </a:p>
+        </p:txBody>
+      </p:sp>
+      <p:sp>
+        <p:nvSpPr>
+          <p:cNvPr id="90" name="正方形/長方形 89"/>
+          <p:cNvSpPr/>
+          <p:nvPr/>
+        </p:nvSpPr>
+        <p:spPr>
+          <a:xfrm>
+            <a:off x="7336818" y="7486314"/>
+            <a:ext cx="432048" cy="164366"/>
+          </a:xfrm>
+          <a:prstGeom prst="rect">
+            <a:avLst/>
+          </a:prstGeom>
+          <a:noFill/>
+          <a:ln>
+            <a:solidFill>
+              <a:schemeClr val="accent6"/>
+            </a:solidFill>
+          </a:ln>
+        </p:spPr>
+        <p:style>
+          <a:lnRef idx="0">
+            <a:schemeClr val="accent6"/>
+          </a:lnRef>
+          <a:fillRef idx="3">
+            <a:schemeClr val="accent6"/>
+          </a:fillRef>
+          <a:effectRef idx="3">
+            <a:schemeClr val="accent6"/>
+          </a:effectRef>
+          <a:fontRef idx="minor">
+            <a:schemeClr val="lt1"/>
+          </a:fontRef>
+        </p:style>
+        <p:txBody>
+          <a:bodyPr rtlCol="0" anchor="ctr"/>
+          <a:lstStyle/>
+          <a:p>
+            <a:pPr algn="ctr"/>
+            <a:endParaRPr kumimoji="1" lang="ja-JP" altLang="en-US"/>
+          </a:p>
+        </p:txBody>
+      </p:sp>
+      <p:sp>
+        <p:nvSpPr>
+          <p:cNvPr id="97" name="正方形/長方形 96"/>
+          <p:cNvSpPr/>
+          <p:nvPr/>
+        </p:nvSpPr>
+        <p:spPr>
+          <a:xfrm>
+            <a:off x="7336818" y="7855139"/>
+            <a:ext cx="432048" cy="164366"/>
+          </a:xfrm>
+          <a:prstGeom prst="rect">
+            <a:avLst/>
+          </a:prstGeom>
+          <a:ln/>
+        </p:spPr>
+        <p:style>
+          <a:lnRef idx="0">
+            <a:schemeClr val="accent6"/>
+          </a:lnRef>
+          <a:fillRef idx="3">
+            <a:schemeClr val="accent6"/>
+          </a:fillRef>
+          <a:effectRef idx="3">
+            <a:schemeClr val="accent6"/>
+          </a:effectRef>
+          <a:fontRef idx="minor">
+            <a:schemeClr val="lt1"/>
+          </a:fontRef>
+        </p:style>
+        <p:txBody>
+          <a:bodyPr rtlCol="0" anchor="ctr"/>
+          <a:lstStyle/>
+          <a:p>
+            <a:pPr algn="ctr"/>
+            <a:endParaRPr kumimoji="1" lang="ja-JP" altLang="en-US"/>
+          </a:p>
+        </p:txBody>
+      </p:sp>
+      <p:sp>
+        <p:nvSpPr>
+          <p:cNvPr id="99" name="正方形/長方形 98"/>
+          <p:cNvSpPr/>
+          <p:nvPr/>
+        </p:nvSpPr>
+        <p:spPr>
+          <a:xfrm>
+            <a:off x="7336818" y="8017159"/>
+            <a:ext cx="432048" cy="164366"/>
+          </a:xfrm>
+          <a:prstGeom prst="rect">
+            <a:avLst/>
+          </a:prstGeom>
+          <a:ln/>
+        </p:spPr>
+        <p:style>
+          <a:lnRef idx="0">
+            <a:schemeClr val="accent6"/>
+          </a:lnRef>
+          <a:fillRef idx="3">
+            <a:schemeClr val="accent6"/>
+          </a:fillRef>
+          <a:effectRef idx="3">
+            <a:schemeClr val="accent6"/>
+          </a:effectRef>
+          <a:fontRef idx="minor">
+            <a:schemeClr val="lt1"/>
+          </a:fontRef>
+        </p:style>
+        <p:txBody>
+          <a:bodyPr rtlCol="0" anchor="ctr"/>
+          <a:lstStyle/>
+          <a:p>
+            <a:pPr algn="ctr"/>
+            <a:endParaRPr kumimoji="1" lang="ja-JP" altLang="en-US"/>
+          </a:p>
+        </p:txBody>
+      </p:sp>
+      <p:sp>
+        <p:nvSpPr>
+          <p:cNvPr id="102" name="正方形/長方形 101"/>
+          <p:cNvSpPr/>
+          <p:nvPr/>
+        </p:nvSpPr>
+        <p:spPr>
+          <a:xfrm>
+            <a:off x="6695566" y="6846589"/>
+            <a:ext cx="432048" cy="164366"/>
+          </a:xfrm>
+          <a:prstGeom prst="rect">
+            <a:avLst/>
+          </a:prstGeom>
+          <a:noFill/>
+          <a:ln>
+            <a:solidFill>
+              <a:srgbClr val="FF0000"/>
+            </a:solidFill>
+          </a:ln>
+        </p:spPr>
+        <p:style>
+          <a:lnRef idx="0">
+            <a:schemeClr val="accent6"/>
+          </a:lnRef>
+          <a:fillRef idx="3">
+            <a:schemeClr val="accent6"/>
+          </a:fillRef>
+          <a:effectRef idx="3">
+            <a:schemeClr val="accent6"/>
+          </a:effectRef>
+          <a:fontRef idx="minor">
+            <a:schemeClr val="lt1"/>
+          </a:fontRef>
+        </p:style>
+        <p:txBody>
+          <a:bodyPr rtlCol="0" anchor="ctr"/>
+          <a:lstStyle/>
+          <a:p>
+            <a:pPr algn="ctr"/>
+            <a:endParaRPr kumimoji="1" lang="ja-JP" altLang="en-US"/>
+          </a:p>
+        </p:txBody>
+      </p:sp>
+      <p:sp>
+        <p:nvSpPr>
+          <p:cNvPr id="105" name="正方形/長方形 104"/>
+          <p:cNvSpPr/>
+          <p:nvPr/>
+        </p:nvSpPr>
+        <p:spPr>
+          <a:xfrm>
+            <a:off x="6695566" y="6673748"/>
+            <a:ext cx="432048" cy="164366"/>
+          </a:xfrm>
+          <a:prstGeom prst="rect">
+            <a:avLst/>
+          </a:prstGeom>
+          <a:noFill/>
+          <a:ln w="12700">
+            <a:solidFill>
+              <a:srgbClr val="FF0000"/>
+            </a:solidFill>
+          </a:ln>
+        </p:spPr>
+        <p:style>
+          <a:lnRef idx="0">
+            <a:schemeClr val="accent6"/>
+          </a:lnRef>
+          <a:fillRef idx="3">
+            <a:schemeClr val="accent6"/>
+          </a:fillRef>
+          <a:effectRef idx="3">
+            <a:schemeClr val="accent6"/>
+          </a:effectRef>
+          <a:fontRef idx="minor">
+            <a:schemeClr val="lt1"/>
+          </a:fontRef>
+        </p:style>
+        <p:txBody>
+          <a:bodyPr rtlCol="0" anchor="ctr"/>
+          <a:lstStyle/>
+          <a:p>
+            <a:pPr algn="ctr"/>
+            <a:endParaRPr kumimoji="1" lang="ja-JP" altLang="en-US"/>
           </a:p>
         </p:txBody>
       </p:sp>
@@ -8523,4 +9264,289 @@
   <a:objectDefaults/>
   <a:extraClrSchemeLst/>
 </a:theme>
+</file>
+
+<file path=ppt/theme/theme2.xml><?xml version="1.0" encoding="utf-8"?>
+<a:theme xmlns:a="http://schemas.openxmlformats.org/drawingml/2006/main" name="Office ​​テーマ">
+  <a:themeElements>
+    <a:clrScheme name="Office">
+      <a:dk1>
+        <a:sysClr val="windowText" lastClr="000000"/>
+      </a:dk1>
+      <a:lt1>
+        <a:sysClr val="window" lastClr="FFFFFF"/>
+      </a:lt1>
+      <a:dk2>
+        <a:srgbClr val="1F497D"/>
+      </a:dk2>
+      <a:lt2>
+        <a:srgbClr val="EEECE1"/>
+      </a:lt2>
+      <a:accent1>
+        <a:srgbClr val="4F81BD"/>
+      </a:accent1>
+      <a:accent2>
+        <a:srgbClr val="C0504D"/>
+      </a:accent2>
+      <a:accent3>
+        <a:srgbClr val="9BBB59"/>
+      </a:accent3>
+      <a:accent4>
+        <a:srgbClr val="8064A2"/>
+      </a:accent4>
+      <a:accent5>
+        <a:srgbClr val="4BACC6"/>
+      </a:accent5>
+      <a:accent6>
+        <a:srgbClr val="F79646"/>
+      </a:accent6>
+      <a:hlink>
+        <a:srgbClr val="0000FF"/>
+      </a:hlink>
+      <a:folHlink>
+        <a:srgbClr val="800080"/>
+      </a:folHlink>
+    </a:clrScheme>
+    <a:fontScheme name="Office">
+      <a:majorFont>
+        <a:latin typeface="Calibri"/>
+        <a:ea typeface=""/>
+        <a:cs typeface=""/>
+        <a:font script="Jpan" typeface="ＭＳ Ｐゴシック"/>
+        <a:font script="Hang" typeface="맑은 고딕"/>
+        <a:font script="Hans" typeface="宋体"/>
+        <a:font script="Hant" typeface="新細明體"/>
+        <a:font script="Arab" typeface="Times New Roman"/>
+        <a:font script="Hebr" typeface="Times New Roman"/>
+        <a:font script="Thai" typeface="Angsana New"/>
+        <a:font script="Ethi" typeface="Nyala"/>
+        <a:font script="Beng" typeface="Vrinda"/>
+        <a:font script="Gujr" typeface="Shruti"/>
+        <a:font script="Khmr" typeface="MoolBoran"/>
+        <a:font script="Knda" typeface="Tunga"/>
+        <a:font script="Guru" typeface="Raavi"/>
+        <a:font script="Cans" typeface="Euphemia"/>
+        <a:font script="Cher" typeface="Plantagenet Cherokee"/>
+        <a:font script="Yiii" typeface="Microsoft Yi Baiti"/>
+        <a:font script="Tibt" typeface="Microsoft Himalaya"/>
+        <a:font script="Thaa" typeface="MV Boli"/>
+        <a:font script="Deva" typeface="Mangal"/>
+        <a:font script="Telu" typeface="Gautami"/>
+        <a:font script="Taml" typeface="Latha"/>
+        <a:font script="Syrc" typeface="Estrangelo Edessa"/>
+        <a:font script="Orya" typeface="Kalinga"/>
+        <a:font script="Mlym" typeface="Kartika"/>
+        <a:font script="Laoo" typeface="DokChampa"/>
+        <a:font script="Sinh" typeface="Iskoola Pota"/>
+        <a:font script="Mong" typeface="Mongolian Baiti"/>
+        <a:font script="Viet" typeface="Times New Roman"/>
+        <a:font script="Uigh" typeface="Microsoft Uighur"/>
+        <a:font script="Geor" typeface="Sylfaen"/>
+      </a:majorFont>
+      <a:minorFont>
+        <a:latin typeface="Calibri"/>
+        <a:ea typeface=""/>
+        <a:cs typeface=""/>
+        <a:font script="Jpan" typeface="ＭＳ Ｐゴシック"/>
+        <a:font script="Hang" typeface="맑은 고딕"/>
+        <a:font script="Hans" typeface="宋体"/>
+        <a:font script="Hant" typeface="新細明體"/>
+        <a:font script="Arab" typeface="Arial"/>
+        <a:font script="Hebr" typeface="Arial"/>
+        <a:font script="Thai" typeface="Cordia New"/>
+        <a:font script="Ethi" typeface="Nyala"/>
+        <a:font script="Beng" typeface="Vrinda"/>
+        <a:font script="Gujr" typeface="Shruti"/>
+        <a:font script="Khmr" typeface="DaunPenh"/>
+        <a:font script="Knda" typeface="Tunga"/>
+        <a:font script="Guru" typeface="Raavi"/>
+        <a:font script="Cans" typeface="Euphemia"/>
+        <a:font script="Cher" typeface="Plantagenet Cherokee"/>
+        <a:font script="Yiii" typeface="Microsoft Yi Baiti"/>
+        <a:font script="Tibt" typeface="Microsoft Himalaya"/>
+        <a:font script="Thaa" typeface="MV Boli"/>
+        <a:font script="Deva" typeface="Mangal"/>
+        <a:font script="Telu" typeface="Gautami"/>
+        <a:font script="Taml" typeface="Latha"/>
+        <a:font script="Syrc" typeface="Estrangelo Edessa"/>
+        <a:font script="Orya" typeface="Kalinga"/>
+        <a:font script="Mlym" typeface="Kartika"/>
+        <a:font script="Laoo" typeface="DokChampa"/>
+        <a:font script="Sinh" typeface="Iskoola Pota"/>
+        <a:font script="Mong" typeface="Mongolian Baiti"/>
+        <a:font script="Viet" typeface="Arial"/>
+        <a:font script="Uigh" typeface="Microsoft Uighur"/>
+        <a:font script="Geor" typeface="Sylfaen"/>
+      </a:minorFont>
+    </a:fontScheme>
+    <a:fmtScheme name="Office">
+      <a:fillStyleLst>
+        <a:solidFill>
+          <a:schemeClr val="phClr"/>
+        </a:solidFill>
+        <a:gradFill rotWithShape="1">
+          <a:gsLst>
+            <a:gs pos="0">
+              <a:schemeClr val="phClr">
+                <a:tint val="50000"/>
+                <a:satMod val="300000"/>
+              </a:schemeClr>
+            </a:gs>
+            <a:gs pos="35000">
+              <a:schemeClr val="phClr">
+                <a:tint val="37000"/>
+                <a:satMod val="300000"/>
+              </a:schemeClr>
+            </a:gs>
+            <a:gs pos="100000">
+              <a:schemeClr val="phClr">
+                <a:tint val="15000"/>
+                <a:satMod val="350000"/>
+              </a:schemeClr>
+            </a:gs>
+          </a:gsLst>
+          <a:lin ang="16200000" scaled="1"/>
+        </a:gradFill>
+        <a:gradFill rotWithShape="1">
+          <a:gsLst>
+            <a:gs pos="0">
+              <a:schemeClr val="phClr">
+                <a:shade val="51000"/>
+                <a:satMod val="130000"/>
+              </a:schemeClr>
+            </a:gs>
+            <a:gs pos="80000">
+              <a:schemeClr val="phClr">
+                <a:shade val="93000"/>
+                <a:satMod val="130000"/>
+              </a:schemeClr>
+            </a:gs>
+            <a:gs pos="100000">
+              <a:schemeClr val="phClr">
+                <a:shade val="94000"/>
+                <a:satMod val="135000"/>
+              </a:schemeClr>
+            </a:gs>
+          </a:gsLst>
+          <a:lin ang="16200000" scaled="0"/>
+        </a:gradFill>
+      </a:fillStyleLst>
+      <a:lnStyleLst>
+        <a:ln w="9525" cap="flat" cmpd="sng" algn="ctr">
+          <a:solidFill>
+            <a:schemeClr val="phClr">
+              <a:shade val="95000"/>
+              <a:satMod val="105000"/>
+            </a:schemeClr>
+          </a:solidFill>
+          <a:prstDash val="solid"/>
+        </a:ln>
+        <a:ln w="25400" cap="flat" cmpd="sng" algn="ctr">
+          <a:solidFill>
+            <a:schemeClr val="phClr"/>
+          </a:solidFill>
+          <a:prstDash val="solid"/>
+        </a:ln>
+        <a:ln w="38100" cap="flat" cmpd="sng" algn="ctr">
+          <a:solidFill>
+            <a:schemeClr val="phClr"/>
+          </a:solidFill>
+          <a:prstDash val="solid"/>
+        </a:ln>
+      </a:lnStyleLst>
+      <a:effectStyleLst>
+        <a:effectStyle>
+          <a:effectLst>
+            <a:outerShdw blurRad="40000" dist="20000" dir="5400000" rotWithShape="0">
+              <a:srgbClr val="000000">
+                <a:alpha val="38000"/>
+              </a:srgbClr>
+            </a:outerShdw>
+          </a:effectLst>
+        </a:effectStyle>
+        <a:effectStyle>
+          <a:effectLst>
+            <a:outerShdw blurRad="40000" dist="23000" dir="5400000" rotWithShape="0">
+              <a:srgbClr val="000000">
+                <a:alpha val="35000"/>
+              </a:srgbClr>
+            </a:outerShdw>
+          </a:effectLst>
+        </a:effectStyle>
+        <a:effectStyle>
+          <a:effectLst>
+            <a:outerShdw blurRad="40000" dist="23000" dir="5400000" rotWithShape="0">
+              <a:srgbClr val="000000">
+                <a:alpha val="35000"/>
+              </a:srgbClr>
+            </a:outerShdw>
+          </a:effectLst>
+          <a:scene3d>
+            <a:camera prst="orthographicFront">
+              <a:rot lat="0" lon="0" rev="0"/>
+            </a:camera>
+            <a:lightRig rig="threePt" dir="t">
+              <a:rot lat="0" lon="0" rev="1200000"/>
+            </a:lightRig>
+          </a:scene3d>
+          <a:sp3d>
+            <a:bevelT w="63500" h="25400"/>
+          </a:sp3d>
+        </a:effectStyle>
+      </a:effectStyleLst>
+      <a:bgFillStyleLst>
+        <a:solidFill>
+          <a:schemeClr val="phClr"/>
+        </a:solidFill>
+        <a:gradFill rotWithShape="1">
+          <a:gsLst>
+            <a:gs pos="0">
+              <a:schemeClr val="phClr">
+                <a:tint val="40000"/>
+                <a:satMod val="350000"/>
+              </a:schemeClr>
+            </a:gs>
+            <a:gs pos="40000">
+              <a:schemeClr val="phClr">
+                <a:tint val="45000"/>
+                <a:shade val="99000"/>
+                <a:satMod val="350000"/>
+              </a:schemeClr>
+            </a:gs>
+            <a:gs pos="100000">
+              <a:schemeClr val="phClr">
+                <a:shade val="20000"/>
+                <a:satMod val="255000"/>
+              </a:schemeClr>
+            </a:gs>
+          </a:gsLst>
+          <a:path path="circle">
+            <a:fillToRect l="50000" t="-80000" r="50000" b="180000"/>
+          </a:path>
+        </a:gradFill>
+        <a:gradFill rotWithShape="1">
+          <a:gsLst>
+            <a:gs pos="0">
+              <a:schemeClr val="phClr">
+                <a:tint val="80000"/>
+                <a:satMod val="300000"/>
+              </a:schemeClr>
+            </a:gs>
+            <a:gs pos="100000">
+              <a:schemeClr val="phClr">
+                <a:shade val="30000"/>
+                <a:satMod val="200000"/>
+              </a:schemeClr>
+            </a:gs>
+          </a:gsLst>
+          <a:path path="circle">
+            <a:fillToRect l="50000" t="50000" r="50000" b="50000"/>
+          </a:path>
+        </a:gradFill>
+      </a:bgFillStyleLst>
+    </a:fmtScheme>
+  </a:themeElements>
+  <a:objectDefaults/>
+  <a:extraClrSchemeLst/>
+</a:theme>
 </file>
</xml_diff>

<commit_message>
added parallel seaquence analysis
</commit_message>
<xml_diff>
--- a/models/ForModelSheet/YousoGizyutu.pptx
+++ b/models/ForModelSheet/YousoGizyutu.pptx
@@ -12,7 +12,7 @@
     <p:sldId id="257" r:id="rId3"/>
   </p:sldIdLst>
   <p:sldSz cx="12801600" cy="9601200" type="A3"/>
-  <p:notesSz cx="6858000" cy="9144000"/>
+  <p:notesSz cx="6797675" cy="9872663"/>
   <p:defaultTextStyle>
     <a:defPPr>
       <a:defRPr lang="ja-JP"/>
@@ -111,1154 +111,6 @@
 </p:presentation>
 </file>
 
-<file path=ppt/charts/chart1.xml><?xml version="1.0" encoding="utf-8"?>
-<c:chartSpace xmlns:c="http://schemas.openxmlformats.org/drawingml/2006/chart" xmlns:a="http://schemas.openxmlformats.org/drawingml/2006/main" xmlns:r="http://schemas.openxmlformats.org/officeDocument/2006/relationships">
-  <c:date1904 val="0"/>
-  <c:lang val="ja-JP"/>
-  <c:roundedCorners val="0"/>
-  <mc:AlternateContent xmlns:mc="http://schemas.openxmlformats.org/markup-compatibility/2006">
-    <mc:Choice xmlns:c14="http://schemas.microsoft.com/office/drawing/2007/8/2/chart" Requires="c14">
-      <c14:style val="102"/>
-    </mc:Choice>
-    <mc:Fallback>
-      <c:style val="2"/>
-    </mc:Fallback>
-  </mc:AlternateContent>
-  <c:chart>
-    <c:autoTitleDeleted val="0"/>
-    <c:plotArea>
-      <c:layout>
-        <c:manualLayout>
-          <c:layoutTarget val="inner"/>
-          <c:xMode val="edge"/>
-          <c:yMode val="edge"/>
-          <c:x val="0.10220892123097433"/>
-          <c:y val="5.6183437516934484E-2"/>
-          <c:w val="0.65717059215642704"/>
-          <c:h val="0.887633124966131"/>
-        </c:manualLayout>
-      </c:layout>
-      <c:scatterChart>
-        <c:scatterStyle val="smoothMarker"/>
-        <c:varyColors val="0"/>
-        <c:ser>
-          <c:idx val="0"/>
-          <c:order val="0"/>
-          <c:tx>
-            <c:strRef>
-              <c:f>'PWM-100_100'!$K$1</c:f>
-              <c:strCache>
-                <c:ptCount val="1"/>
-                <c:pt idx="0">
-                  <c:v>PWM１００</c:v>
-                </c:pt>
-              </c:strCache>
-            </c:strRef>
-          </c:tx>
-          <c:yVal>
-            <c:numRef>
-              <c:f>'PWM-100_100'!$K$2:$K$189</c:f>
-              <c:numCache>
-                <c:formatCode>General</c:formatCode>
-                <c:ptCount val="188"/>
-                <c:pt idx="0">
-                  <c:v>0</c:v>
-                </c:pt>
-                <c:pt idx="1">
-                  <c:v>0</c:v>
-                </c:pt>
-                <c:pt idx="2">
-                  <c:v>0</c:v>
-                </c:pt>
-                <c:pt idx="3">
-                  <c:v>0</c:v>
-                </c:pt>
-                <c:pt idx="4">
-                  <c:v>0</c:v>
-                </c:pt>
-                <c:pt idx="5">
-                  <c:v>17</c:v>
-                </c:pt>
-                <c:pt idx="6">
-                  <c:v>0</c:v>
-                </c:pt>
-                <c:pt idx="7">
-                  <c:v>0</c:v>
-                </c:pt>
-                <c:pt idx="8">
-                  <c:v>8</c:v>
-                </c:pt>
-                <c:pt idx="9">
-                  <c:v>0</c:v>
-                </c:pt>
-                <c:pt idx="10">
-                  <c:v>8</c:v>
-                </c:pt>
-                <c:pt idx="11">
-                  <c:v>8</c:v>
-                </c:pt>
-                <c:pt idx="12">
-                  <c:v>8</c:v>
-                </c:pt>
-                <c:pt idx="13">
-                  <c:v>17</c:v>
-                </c:pt>
-                <c:pt idx="14">
-                  <c:v>17</c:v>
-                </c:pt>
-                <c:pt idx="15">
-                  <c:v>8</c:v>
-                </c:pt>
-                <c:pt idx="16">
-                  <c:v>17</c:v>
-                </c:pt>
-                <c:pt idx="17">
-                  <c:v>17</c:v>
-                </c:pt>
-                <c:pt idx="18">
-                  <c:v>17</c:v>
-                </c:pt>
-                <c:pt idx="19">
-                  <c:v>26</c:v>
-                </c:pt>
-                <c:pt idx="20">
-                  <c:v>17</c:v>
-                </c:pt>
-                <c:pt idx="21">
-                  <c:v>26</c:v>
-                </c:pt>
-                <c:pt idx="22">
-                  <c:v>26</c:v>
-                </c:pt>
-                <c:pt idx="23">
-                  <c:v>26</c:v>
-                </c:pt>
-                <c:pt idx="24">
-                  <c:v>35</c:v>
-                </c:pt>
-                <c:pt idx="25">
-                  <c:v>26</c:v>
-                </c:pt>
-                <c:pt idx="26">
-                  <c:v>35</c:v>
-                </c:pt>
-                <c:pt idx="27">
-                  <c:v>35</c:v>
-                </c:pt>
-                <c:pt idx="28">
-                  <c:v>35</c:v>
-                </c:pt>
-                <c:pt idx="29">
-                  <c:v>35</c:v>
-                </c:pt>
-                <c:pt idx="30">
-                  <c:v>35</c:v>
-                </c:pt>
-                <c:pt idx="31">
-                  <c:v>35</c:v>
-                </c:pt>
-                <c:pt idx="32">
-                  <c:v>35</c:v>
-                </c:pt>
-                <c:pt idx="33">
-                  <c:v>44</c:v>
-                </c:pt>
-                <c:pt idx="34">
-                  <c:v>44</c:v>
-                </c:pt>
-                <c:pt idx="35">
-                  <c:v>53</c:v>
-                </c:pt>
-                <c:pt idx="36">
-                  <c:v>53</c:v>
-                </c:pt>
-                <c:pt idx="37">
-                  <c:v>53</c:v>
-                </c:pt>
-                <c:pt idx="38">
-                  <c:v>53</c:v>
-                </c:pt>
-                <c:pt idx="39">
-                  <c:v>53</c:v>
-                </c:pt>
-                <c:pt idx="40">
-                  <c:v>53</c:v>
-                </c:pt>
-                <c:pt idx="41">
-                  <c:v>53</c:v>
-                </c:pt>
-                <c:pt idx="42">
-                  <c:v>62</c:v>
-                </c:pt>
-                <c:pt idx="43">
-                  <c:v>53</c:v>
-                </c:pt>
-                <c:pt idx="44">
-                  <c:v>53</c:v>
-                </c:pt>
-                <c:pt idx="45">
-                  <c:v>62</c:v>
-                </c:pt>
-                <c:pt idx="46">
-                  <c:v>53</c:v>
-                </c:pt>
-                <c:pt idx="47">
-                  <c:v>53</c:v>
-                </c:pt>
-                <c:pt idx="48">
-                  <c:v>53</c:v>
-                </c:pt>
-                <c:pt idx="49">
-                  <c:v>53</c:v>
-                </c:pt>
-                <c:pt idx="50">
-                  <c:v>53</c:v>
-                </c:pt>
-                <c:pt idx="51">
-                  <c:v>53</c:v>
-                </c:pt>
-                <c:pt idx="52">
-                  <c:v>53</c:v>
-                </c:pt>
-                <c:pt idx="53">
-                  <c:v>53</c:v>
-                </c:pt>
-                <c:pt idx="54">
-                  <c:v>53</c:v>
-                </c:pt>
-                <c:pt idx="55">
-                  <c:v>62</c:v>
-                </c:pt>
-                <c:pt idx="56">
-                  <c:v>62</c:v>
-                </c:pt>
-                <c:pt idx="57">
-                  <c:v>62</c:v>
-                </c:pt>
-                <c:pt idx="58">
-                  <c:v>62</c:v>
-                </c:pt>
-                <c:pt idx="59">
-                  <c:v>53</c:v>
-                </c:pt>
-                <c:pt idx="60">
-                  <c:v>53</c:v>
-                </c:pt>
-                <c:pt idx="61">
-                  <c:v>71</c:v>
-                </c:pt>
-                <c:pt idx="62">
-                  <c:v>71</c:v>
-                </c:pt>
-                <c:pt idx="63">
-                  <c:v>62</c:v>
-                </c:pt>
-                <c:pt idx="64">
-                  <c:v>62</c:v>
-                </c:pt>
-                <c:pt idx="65">
-                  <c:v>62</c:v>
-                </c:pt>
-                <c:pt idx="66">
-                  <c:v>44</c:v>
-                </c:pt>
-                <c:pt idx="67">
-                  <c:v>62</c:v>
-                </c:pt>
-                <c:pt idx="68">
-                  <c:v>62</c:v>
-                </c:pt>
-                <c:pt idx="69">
-                  <c:v>53</c:v>
-                </c:pt>
-                <c:pt idx="70">
-                  <c:v>62</c:v>
-                </c:pt>
-                <c:pt idx="71">
-                  <c:v>71</c:v>
-                </c:pt>
-                <c:pt idx="72">
-                  <c:v>53</c:v>
-                </c:pt>
-                <c:pt idx="73">
-                  <c:v>53</c:v>
-                </c:pt>
-                <c:pt idx="74">
-                  <c:v>71</c:v>
-                </c:pt>
-                <c:pt idx="75">
-                  <c:v>53</c:v>
-                </c:pt>
-                <c:pt idx="76">
-                  <c:v>71</c:v>
-                </c:pt>
-                <c:pt idx="77">
-                  <c:v>62</c:v>
-                </c:pt>
-                <c:pt idx="78">
-                  <c:v>62</c:v>
-                </c:pt>
-                <c:pt idx="79">
-                  <c:v>62</c:v>
-                </c:pt>
-                <c:pt idx="80">
-                  <c:v>62</c:v>
-                </c:pt>
-                <c:pt idx="81">
-                  <c:v>62</c:v>
-                </c:pt>
-                <c:pt idx="82">
-                  <c:v>53</c:v>
-                </c:pt>
-                <c:pt idx="83">
-                  <c:v>53</c:v>
-                </c:pt>
-                <c:pt idx="84">
-                  <c:v>62</c:v>
-                </c:pt>
-                <c:pt idx="85">
-                  <c:v>53</c:v>
-                </c:pt>
-                <c:pt idx="86">
-                  <c:v>62</c:v>
-                </c:pt>
-                <c:pt idx="87">
-                  <c:v>53</c:v>
-                </c:pt>
-                <c:pt idx="88">
-                  <c:v>71</c:v>
-                </c:pt>
-                <c:pt idx="89">
-                  <c:v>62</c:v>
-                </c:pt>
-                <c:pt idx="90">
-                  <c:v>53</c:v>
-                </c:pt>
-                <c:pt idx="91">
-                  <c:v>62</c:v>
-                </c:pt>
-                <c:pt idx="92">
-                  <c:v>62</c:v>
-                </c:pt>
-                <c:pt idx="93">
-                  <c:v>62</c:v>
-                </c:pt>
-                <c:pt idx="94">
-                  <c:v>53</c:v>
-                </c:pt>
-                <c:pt idx="95">
-                  <c:v>53</c:v>
-                </c:pt>
-                <c:pt idx="96">
-                  <c:v>62</c:v>
-                </c:pt>
-                <c:pt idx="97">
-                  <c:v>53</c:v>
-                </c:pt>
-                <c:pt idx="98">
-                  <c:v>62</c:v>
-                </c:pt>
-                <c:pt idx="99">
-                  <c:v>62</c:v>
-                </c:pt>
-                <c:pt idx="100">
-                  <c:v>71</c:v>
-                </c:pt>
-                <c:pt idx="101">
-                  <c:v>53</c:v>
-                </c:pt>
-                <c:pt idx="102">
-                  <c:v>53</c:v>
-                </c:pt>
-                <c:pt idx="103">
-                  <c:v>62</c:v>
-                </c:pt>
-                <c:pt idx="104">
-                  <c:v>62</c:v>
-                </c:pt>
-                <c:pt idx="105">
-                  <c:v>62</c:v>
-                </c:pt>
-                <c:pt idx="106">
-                  <c:v>62</c:v>
-                </c:pt>
-                <c:pt idx="107">
-                  <c:v>62</c:v>
-                </c:pt>
-                <c:pt idx="108">
-                  <c:v>71</c:v>
-                </c:pt>
-                <c:pt idx="109">
-                  <c:v>71</c:v>
-                </c:pt>
-                <c:pt idx="110">
-                  <c:v>53</c:v>
-                </c:pt>
-                <c:pt idx="111">
-                  <c:v>53</c:v>
-                </c:pt>
-                <c:pt idx="112">
-                  <c:v>62</c:v>
-                </c:pt>
-                <c:pt idx="113">
-                  <c:v>62</c:v>
-                </c:pt>
-                <c:pt idx="114">
-                  <c:v>62</c:v>
-                </c:pt>
-                <c:pt idx="115">
-                  <c:v>53</c:v>
-                </c:pt>
-                <c:pt idx="116">
-                  <c:v>62</c:v>
-                </c:pt>
-                <c:pt idx="117">
-                  <c:v>53</c:v>
-                </c:pt>
-                <c:pt idx="118">
-                  <c:v>62</c:v>
-                </c:pt>
-                <c:pt idx="119">
-                  <c:v>53</c:v>
-                </c:pt>
-                <c:pt idx="120">
-                  <c:v>71</c:v>
-                </c:pt>
-                <c:pt idx="121">
-                  <c:v>62</c:v>
-                </c:pt>
-                <c:pt idx="122">
-                  <c:v>62</c:v>
-                </c:pt>
-                <c:pt idx="123">
-                  <c:v>62</c:v>
-                </c:pt>
-                <c:pt idx="124">
-                  <c:v>53</c:v>
-                </c:pt>
-                <c:pt idx="125">
-                  <c:v>53</c:v>
-                </c:pt>
-                <c:pt idx="126">
-                  <c:v>62</c:v>
-                </c:pt>
-                <c:pt idx="127">
-                  <c:v>53</c:v>
-                </c:pt>
-                <c:pt idx="128">
-                  <c:v>71</c:v>
-                </c:pt>
-                <c:pt idx="129">
-                  <c:v>62</c:v>
-                </c:pt>
-                <c:pt idx="130">
-                  <c:v>71</c:v>
-                </c:pt>
-                <c:pt idx="131">
-                  <c:v>53</c:v>
-                </c:pt>
-                <c:pt idx="132">
-                  <c:v>53</c:v>
-                </c:pt>
-                <c:pt idx="133">
-                  <c:v>62</c:v>
-                </c:pt>
-                <c:pt idx="134">
-                  <c:v>62</c:v>
-                </c:pt>
-                <c:pt idx="135">
-                  <c:v>62</c:v>
-                </c:pt>
-                <c:pt idx="136">
-                  <c:v>53</c:v>
-                </c:pt>
-                <c:pt idx="137">
-                  <c:v>53</c:v>
-                </c:pt>
-                <c:pt idx="138">
-                  <c:v>53</c:v>
-                </c:pt>
-                <c:pt idx="139">
-                  <c:v>53</c:v>
-                </c:pt>
-                <c:pt idx="140">
-                  <c:v>71</c:v>
-                </c:pt>
-                <c:pt idx="141">
-                  <c:v>62</c:v>
-                </c:pt>
-                <c:pt idx="142">
-                  <c:v>53</c:v>
-                </c:pt>
-                <c:pt idx="143">
-                  <c:v>62</c:v>
-                </c:pt>
-                <c:pt idx="144">
-                  <c:v>62</c:v>
-                </c:pt>
-                <c:pt idx="145">
-                  <c:v>53</c:v>
-                </c:pt>
-                <c:pt idx="146">
-                  <c:v>44</c:v>
-                </c:pt>
-                <c:pt idx="147">
-                  <c:v>53</c:v>
-                </c:pt>
-                <c:pt idx="148">
-                  <c:v>62</c:v>
-                </c:pt>
-                <c:pt idx="149">
-                  <c:v>53</c:v>
-                </c:pt>
-                <c:pt idx="150">
-                  <c:v>53</c:v>
-                </c:pt>
-                <c:pt idx="151">
-                  <c:v>53</c:v>
-                </c:pt>
-                <c:pt idx="152">
-                  <c:v>62</c:v>
-                </c:pt>
-                <c:pt idx="153">
-                  <c:v>53</c:v>
-                </c:pt>
-                <c:pt idx="154">
-                  <c:v>62</c:v>
-                </c:pt>
-                <c:pt idx="155">
-                  <c:v>71</c:v>
-                </c:pt>
-                <c:pt idx="156">
-                  <c:v>53</c:v>
-                </c:pt>
-                <c:pt idx="157">
-                  <c:v>53</c:v>
-                </c:pt>
-                <c:pt idx="158">
-                  <c:v>53</c:v>
-                </c:pt>
-                <c:pt idx="159">
-                  <c:v>53</c:v>
-                </c:pt>
-                <c:pt idx="160">
-                  <c:v>62</c:v>
-                </c:pt>
-                <c:pt idx="161">
-                  <c:v>62</c:v>
-                </c:pt>
-                <c:pt idx="162">
-                  <c:v>71</c:v>
-                </c:pt>
-                <c:pt idx="163">
-                  <c:v>62</c:v>
-                </c:pt>
-                <c:pt idx="164">
-                  <c:v>62</c:v>
-                </c:pt>
-                <c:pt idx="165">
-                  <c:v>71</c:v>
-                </c:pt>
-                <c:pt idx="166">
-                  <c:v>53</c:v>
-                </c:pt>
-                <c:pt idx="167">
-                  <c:v>53</c:v>
-                </c:pt>
-                <c:pt idx="168">
-                  <c:v>62</c:v>
-                </c:pt>
-                <c:pt idx="169">
-                  <c:v>53</c:v>
-                </c:pt>
-                <c:pt idx="170">
-                  <c:v>53</c:v>
-                </c:pt>
-                <c:pt idx="171">
-                  <c:v>53</c:v>
-                </c:pt>
-                <c:pt idx="172">
-                  <c:v>53</c:v>
-                </c:pt>
-                <c:pt idx="173">
-                  <c:v>53</c:v>
-                </c:pt>
-                <c:pt idx="174">
-                  <c:v>53</c:v>
-                </c:pt>
-                <c:pt idx="175">
-                  <c:v>71</c:v>
-                </c:pt>
-                <c:pt idx="176">
-                  <c:v>71</c:v>
-                </c:pt>
-                <c:pt idx="177">
-                  <c:v>71</c:v>
-                </c:pt>
-                <c:pt idx="178">
-                  <c:v>62</c:v>
-                </c:pt>
-                <c:pt idx="179">
-                  <c:v>62</c:v>
-                </c:pt>
-                <c:pt idx="180">
-                  <c:v>53</c:v>
-                </c:pt>
-                <c:pt idx="181">
-                  <c:v>62</c:v>
-                </c:pt>
-                <c:pt idx="182">
-                  <c:v>62</c:v>
-                </c:pt>
-                <c:pt idx="183">
-                  <c:v>62</c:v>
-                </c:pt>
-                <c:pt idx="184">
-                  <c:v>62</c:v>
-                </c:pt>
-                <c:pt idx="185">
-                  <c:v>71</c:v>
-                </c:pt>
-                <c:pt idx="186">
-                  <c:v>62</c:v>
-                </c:pt>
-                <c:pt idx="187">
-                  <c:v>62</c:v>
-                </c:pt>
-              </c:numCache>
-            </c:numRef>
-          </c:yVal>
-          <c:smooth val="1"/>
-        </c:ser>
-        <c:ser>
-          <c:idx val="1"/>
-          <c:order val="1"/>
-          <c:tx>
-            <c:strRef>
-              <c:f>'PWM-100_100'!$N$1</c:f>
-              <c:strCache>
-                <c:ptCount val="1"/>
-                <c:pt idx="0">
-                  <c:v>PWM１２７</c:v>
-                </c:pt>
-              </c:strCache>
-            </c:strRef>
-          </c:tx>
-          <c:yVal>
-            <c:numRef>
-              <c:f>'PWM-100_100'!$N$2:$N$189</c:f>
-              <c:numCache>
-                <c:formatCode>General</c:formatCode>
-                <c:ptCount val="188"/>
-                <c:pt idx="0">
-                  <c:v>0</c:v>
-                </c:pt>
-                <c:pt idx="1">
-                  <c:v>0</c:v>
-                </c:pt>
-                <c:pt idx="2">
-                  <c:v>0</c:v>
-                </c:pt>
-                <c:pt idx="3">
-                  <c:v>0</c:v>
-                </c:pt>
-                <c:pt idx="4">
-                  <c:v>0</c:v>
-                </c:pt>
-                <c:pt idx="5">
-                  <c:v>8</c:v>
-                </c:pt>
-                <c:pt idx="6">
-                  <c:v>0</c:v>
-                </c:pt>
-                <c:pt idx="7">
-                  <c:v>8</c:v>
-                </c:pt>
-                <c:pt idx="8">
-                  <c:v>8</c:v>
-                </c:pt>
-                <c:pt idx="9">
-                  <c:v>0</c:v>
-                </c:pt>
-                <c:pt idx="10">
-                  <c:v>8</c:v>
-                </c:pt>
-                <c:pt idx="11">
-                  <c:v>8</c:v>
-                </c:pt>
-                <c:pt idx="12">
-                  <c:v>0</c:v>
-                </c:pt>
-                <c:pt idx="13">
-                  <c:v>0</c:v>
-                </c:pt>
-                <c:pt idx="14">
-                  <c:v>8</c:v>
-                </c:pt>
-                <c:pt idx="15">
-                  <c:v>17</c:v>
-                </c:pt>
-                <c:pt idx="16">
-                  <c:v>26</c:v>
-                </c:pt>
-                <c:pt idx="17">
-                  <c:v>26</c:v>
-                </c:pt>
-                <c:pt idx="18">
-                  <c:v>17</c:v>
-                </c:pt>
-                <c:pt idx="19">
-                  <c:v>17</c:v>
-                </c:pt>
-                <c:pt idx="20">
-                  <c:v>8</c:v>
-                </c:pt>
-                <c:pt idx="21">
-                  <c:v>26</c:v>
-                </c:pt>
-                <c:pt idx="22">
-                  <c:v>35</c:v>
-                </c:pt>
-                <c:pt idx="23">
-                  <c:v>35</c:v>
-                </c:pt>
-                <c:pt idx="24">
-                  <c:v>35</c:v>
-                </c:pt>
-                <c:pt idx="25">
-                  <c:v>35</c:v>
-                </c:pt>
-                <c:pt idx="26">
-                  <c:v>35</c:v>
-                </c:pt>
-                <c:pt idx="27">
-                  <c:v>26</c:v>
-                </c:pt>
-                <c:pt idx="28">
-                  <c:v>35</c:v>
-                </c:pt>
-                <c:pt idx="29">
-                  <c:v>35</c:v>
-                </c:pt>
-                <c:pt idx="30">
-                  <c:v>35</c:v>
-                </c:pt>
-                <c:pt idx="31">
-                  <c:v>35</c:v>
-                </c:pt>
-                <c:pt idx="32">
-                  <c:v>35</c:v>
-                </c:pt>
-                <c:pt idx="33">
-                  <c:v>35</c:v>
-                </c:pt>
-                <c:pt idx="34">
-                  <c:v>44</c:v>
-                </c:pt>
-                <c:pt idx="35">
-                  <c:v>53</c:v>
-                </c:pt>
-                <c:pt idx="36">
-                  <c:v>44</c:v>
-                </c:pt>
-                <c:pt idx="37">
-                  <c:v>44</c:v>
-                </c:pt>
-                <c:pt idx="38">
-                  <c:v>53</c:v>
-                </c:pt>
-                <c:pt idx="39">
-                  <c:v>53</c:v>
-                </c:pt>
-                <c:pt idx="40">
-                  <c:v>44</c:v>
-                </c:pt>
-                <c:pt idx="41">
-                  <c:v>53</c:v>
-                </c:pt>
-                <c:pt idx="42">
-                  <c:v>53</c:v>
-                </c:pt>
-                <c:pt idx="43">
-                  <c:v>62</c:v>
-                </c:pt>
-                <c:pt idx="44">
-                  <c:v>53</c:v>
-                </c:pt>
-                <c:pt idx="45">
-                  <c:v>71</c:v>
-                </c:pt>
-                <c:pt idx="46">
-                  <c:v>53</c:v>
-                </c:pt>
-                <c:pt idx="47">
-                  <c:v>62</c:v>
-                </c:pt>
-                <c:pt idx="48">
-                  <c:v>53</c:v>
-                </c:pt>
-                <c:pt idx="49">
-                  <c:v>53</c:v>
-                </c:pt>
-                <c:pt idx="50">
-                  <c:v>53</c:v>
-                </c:pt>
-                <c:pt idx="51">
-                  <c:v>62</c:v>
-                </c:pt>
-                <c:pt idx="52">
-                  <c:v>62</c:v>
-                </c:pt>
-                <c:pt idx="53">
-                  <c:v>53</c:v>
-                </c:pt>
-                <c:pt idx="54">
-                  <c:v>53</c:v>
-                </c:pt>
-                <c:pt idx="55">
-                  <c:v>53</c:v>
-                </c:pt>
-                <c:pt idx="56">
-                  <c:v>62</c:v>
-                </c:pt>
-                <c:pt idx="57">
-                  <c:v>53</c:v>
-                </c:pt>
-                <c:pt idx="58">
-                  <c:v>62</c:v>
-                </c:pt>
-                <c:pt idx="59">
-                  <c:v>53</c:v>
-                </c:pt>
-                <c:pt idx="60">
-                  <c:v>44</c:v>
-                </c:pt>
-                <c:pt idx="61">
-                  <c:v>53</c:v>
-                </c:pt>
-                <c:pt idx="62">
-                  <c:v>71</c:v>
-                </c:pt>
-                <c:pt idx="63">
-                  <c:v>62</c:v>
-                </c:pt>
-                <c:pt idx="64">
-                  <c:v>71</c:v>
-                </c:pt>
-                <c:pt idx="65">
-                  <c:v>53</c:v>
-                </c:pt>
-                <c:pt idx="66">
-                  <c:v>53</c:v>
-                </c:pt>
-                <c:pt idx="67">
-                  <c:v>62</c:v>
-                </c:pt>
-                <c:pt idx="68">
-                  <c:v>62</c:v>
-                </c:pt>
-                <c:pt idx="69">
-                  <c:v>62</c:v>
-                </c:pt>
-                <c:pt idx="70">
-                  <c:v>53</c:v>
-                </c:pt>
-                <c:pt idx="71">
-                  <c:v>62</c:v>
-                </c:pt>
-                <c:pt idx="72">
-                  <c:v>62</c:v>
-                </c:pt>
-                <c:pt idx="73">
-                  <c:v>62</c:v>
-                </c:pt>
-                <c:pt idx="74">
-                  <c:v>53</c:v>
-                </c:pt>
-                <c:pt idx="75">
-                  <c:v>62</c:v>
-                </c:pt>
-                <c:pt idx="76">
-                  <c:v>62</c:v>
-                </c:pt>
-                <c:pt idx="77">
-                  <c:v>53</c:v>
-                </c:pt>
-                <c:pt idx="78">
-                  <c:v>53</c:v>
-                </c:pt>
-                <c:pt idx="79">
-                  <c:v>71</c:v>
-                </c:pt>
-                <c:pt idx="80">
-                  <c:v>53</c:v>
-                </c:pt>
-                <c:pt idx="81">
-                  <c:v>53</c:v>
-                </c:pt>
-                <c:pt idx="82">
-                  <c:v>53</c:v>
-                </c:pt>
-                <c:pt idx="83">
-                  <c:v>62</c:v>
-                </c:pt>
-                <c:pt idx="84">
-                  <c:v>53</c:v>
-                </c:pt>
-                <c:pt idx="85">
-                  <c:v>53</c:v>
-                </c:pt>
-                <c:pt idx="86">
-                  <c:v>53</c:v>
-                </c:pt>
-                <c:pt idx="87">
-                  <c:v>62</c:v>
-                </c:pt>
-                <c:pt idx="88">
-                  <c:v>62</c:v>
-                </c:pt>
-                <c:pt idx="89">
-                  <c:v>53</c:v>
-                </c:pt>
-                <c:pt idx="90">
-                  <c:v>62</c:v>
-                </c:pt>
-                <c:pt idx="91">
-                  <c:v>53</c:v>
-                </c:pt>
-                <c:pt idx="92">
-                  <c:v>62</c:v>
-                </c:pt>
-                <c:pt idx="93">
-                  <c:v>53</c:v>
-                </c:pt>
-                <c:pt idx="94">
-                  <c:v>71</c:v>
-                </c:pt>
-                <c:pt idx="95">
-                  <c:v>62</c:v>
-                </c:pt>
-                <c:pt idx="96">
-                  <c:v>53</c:v>
-                </c:pt>
-                <c:pt idx="97">
-                  <c:v>62</c:v>
-                </c:pt>
-                <c:pt idx="98">
-                  <c:v>71</c:v>
-                </c:pt>
-                <c:pt idx="99">
-                  <c:v>53</c:v>
-                </c:pt>
-                <c:pt idx="100">
-                  <c:v>62</c:v>
-                </c:pt>
-                <c:pt idx="101">
-                  <c:v>62</c:v>
-                </c:pt>
-                <c:pt idx="102">
-                  <c:v>53</c:v>
-                </c:pt>
-                <c:pt idx="103">
-                  <c:v>62</c:v>
-                </c:pt>
-                <c:pt idx="104">
-                  <c:v>62</c:v>
-                </c:pt>
-                <c:pt idx="105">
-                  <c:v>53</c:v>
-                </c:pt>
-                <c:pt idx="106">
-                  <c:v>53</c:v>
-                </c:pt>
-                <c:pt idx="107">
-                  <c:v>62</c:v>
-                </c:pt>
-                <c:pt idx="108">
-                  <c:v>53</c:v>
-                </c:pt>
-                <c:pt idx="109">
-                  <c:v>62</c:v>
-                </c:pt>
-                <c:pt idx="110">
-                  <c:v>62</c:v>
-                </c:pt>
-                <c:pt idx="111">
-                  <c:v>53</c:v>
-                </c:pt>
-                <c:pt idx="112">
-                  <c:v>71</c:v>
-                </c:pt>
-                <c:pt idx="113">
-                  <c:v>62</c:v>
-                </c:pt>
-                <c:pt idx="114">
-                  <c:v>71</c:v>
-                </c:pt>
-                <c:pt idx="115">
-                  <c:v>62</c:v>
-                </c:pt>
-                <c:pt idx="116">
-                  <c:v>62</c:v>
-                </c:pt>
-                <c:pt idx="117">
-                  <c:v>53</c:v>
-                </c:pt>
-                <c:pt idx="118">
-                  <c:v>71</c:v>
-                </c:pt>
-                <c:pt idx="119">
-                  <c:v>53</c:v>
-                </c:pt>
-                <c:pt idx="120">
-                  <c:v>62</c:v>
-                </c:pt>
-                <c:pt idx="121">
-                  <c:v>62</c:v>
-                </c:pt>
-                <c:pt idx="122">
-                  <c:v>53</c:v>
-                </c:pt>
-                <c:pt idx="123">
-                  <c:v>62</c:v>
-                </c:pt>
-                <c:pt idx="124">
-                  <c:v>62</c:v>
-                </c:pt>
-                <c:pt idx="125">
-                  <c:v>71</c:v>
-                </c:pt>
-                <c:pt idx="126">
-                  <c:v>62</c:v>
-                </c:pt>
-                <c:pt idx="127">
-                  <c:v>53</c:v>
-                </c:pt>
-                <c:pt idx="128">
-                  <c:v>53</c:v>
-                </c:pt>
-                <c:pt idx="129">
-                  <c:v>53</c:v>
-                </c:pt>
-                <c:pt idx="130">
-                  <c:v>53</c:v>
-                </c:pt>
-                <c:pt idx="131">
-                  <c:v>53</c:v>
-                </c:pt>
-                <c:pt idx="132">
-                  <c:v>71</c:v>
-                </c:pt>
-                <c:pt idx="133">
-                  <c:v>71</c:v>
-                </c:pt>
-                <c:pt idx="134">
-                  <c:v>62</c:v>
-                </c:pt>
-                <c:pt idx="135">
-                  <c:v>71</c:v>
-                </c:pt>
-                <c:pt idx="136">
-                  <c:v>71</c:v>
-                </c:pt>
-                <c:pt idx="137">
-                  <c:v>71</c:v>
-                </c:pt>
-                <c:pt idx="138">
-                  <c:v>62</c:v>
-                </c:pt>
-                <c:pt idx="139">
-                  <c:v>53</c:v>
-                </c:pt>
-                <c:pt idx="140">
-                  <c:v>62</c:v>
-                </c:pt>
-                <c:pt idx="141">
-                  <c:v>62</c:v>
-                </c:pt>
-                <c:pt idx="142">
-                  <c:v>71</c:v>
-                </c:pt>
-                <c:pt idx="143">
-                  <c:v>71</c:v>
-                </c:pt>
-                <c:pt idx="144">
-                  <c:v>53</c:v>
-                </c:pt>
-                <c:pt idx="145">
-                  <c:v>71</c:v>
-                </c:pt>
-              </c:numCache>
-            </c:numRef>
-          </c:yVal>
-          <c:smooth val="1"/>
-        </c:ser>
-        <c:dLbls>
-          <c:showLegendKey val="0"/>
-          <c:showVal val="0"/>
-          <c:showCatName val="0"/>
-          <c:showSerName val="0"/>
-          <c:showPercent val="0"/>
-          <c:showBubbleSize val="0"/>
-        </c:dLbls>
-        <c:axId val="79215232"/>
-        <c:axId val="79909248"/>
-      </c:scatterChart>
-      <c:valAx>
-        <c:axId val="79215232"/>
-        <c:scaling>
-          <c:orientation val="minMax"/>
-        </c:scaling>
-        <c:delete val="0"/>
-        <c:axPos val="b"/>
-        <c:majorTickMark val="out"/>
-        <c:minorTickMark val="none"/>
-        <c:tickLblPos val="nextTo"/>
-        <c:crossAx val="79909248"/>
-        <c:crosses val="autoZero"/>
-        <c:crossBetween val="midCat"/>
-      </c:valAx>
-      <c:valAx>
-        <c:axId val="79909248"/>
-        <c:scaling>
-          <c:orientation val="minMax"/>
-        </c:scaling>
-        <c:delete val="0"/>
-        <c:axPos val="l"/>
-        <c:majorGridlines/>
-        <c:numFmt formatCode="General" sourceLinked="1"/>
-        <c:majorTickMark val="out"/>
-        <c:minorTickMark val="none"/>
-        <c:tickLblPos val="nextTo"/>
-        <c:crossAx val="79215232"/>
-        <c:crosses val="autoZero"/>
-        <c:crossBetween val="midCat"/>
-      </c:valAx>
-    </c:plotArea>
-    <c:legend>
-      <c:legendPos val="r"/>
-      <c:layout>
-        <c:manualLayout>
-          <c:xMode val="edge"/>
-          <c:yMode val="edge"/>
-          <c:x val="0.69802049772247532"/>
-          <c:y val="0.81332660204201979"/>
-          <c:w val="0.29139734473947337"/>
-          <c:h val="0.18301435406698566"/>
-        </c:manualLayout>
-      </c:layout>
-      <c:overlay val="0"/>
-    </c:legend>
-    <c:plotVisOnly val="1"/>
-    <c:dispBlanksAs val="gap"/>
-    <c:showDLblsOverMax val="0"/>
-  </c:chart>
-  <c:externalData r:id="rId1">
-    <c:autoUpdate val="0"/>
-  </c:externalData>
-</c:chartSpace>
-</file>
-
 <file path=ppt/notesMasters/notesMaster1.xml><?xml version="1.0" encoding="utf-8"?>
 <p:notesMaster xmlns:a="http://schemas.openxmlformats.org/drawingml/2006/main" xmlns:r="http://schemas.openxmlformats.org/officeDocument/2006/relationships" xmlns:p="http://schemas.openxmlformats.org/presentationml/2006/main">
   <p:cSld>
@@ -1294,7 +146,7 @@
         <p:spPr>
           <a:xfrm>
             <a:off x="0" y="0"/>
-            <a:ext cx="2971800" cy="457200"/>
+            <a:ext cx="2945659" cy="493633"/>
           </a:xfrm>
           <a:prstGeom prst="rect">
             <a:avLst/>
@@ -1324,8 +176,8 @@
         </p:nvSpPr>
         <p:spPr>
           <a:xfrm>
-            <a:off x="3884613" y="0"/>
-            <a:ext cx="2971800" cy="457200"/>
+            <a:off x="3850443" y="0"/>
+            <a:ext cx="2945659" cy="493633"/>
           </a:xfrm>
           <a:prstGeom prst="rect">
             <a:avLst/>
@@ -1341,7 +193,7 @@
           <a:p>
             <a:fld id="{E619483D-EE48-47B9-922B-B39AF890B10F}" type="datetimeFigureOut">
               <a:rPr kumimoji="1" lang="ja-JP" altLang="en-US" smtClean="0"/>
-              <a:t>2012/9/5</a:t>
+              <a:t>2012/9/6</a:t>
             </a:fld>
             <a:endParaRPr kumimoji="1" lang="ja-JP" altLang="en-US"/>
           </a:p>
@@ -1359,8 +211,8 @@
         </p:nvSpPr>
         <p:spPr>
           <a:xfrm>
-            <a:off x="1143000" y="685800"/>
-            <a:ext cx="4572000" cy="3429000"/>
+            <a:off x="930275" y="739775"/>
+            <a:ext cx="4937125" cy="3703638"/>
           </a:xfrm>
           <a:prstGeom prst="rect">
             <a:avLst/>
@@ -1392,8 +244,8 @@
         </p:nvSpPr>
         <p:spPr>
           <a:xfrm>
-            <a:off x="685800" y="4343400"/>
-            <a:ext cx="5486400" cy="4114800"/>
+            <a:off x="679768" y="4689515"/>
+            <a:ext cx="5438140" cy="4442698"/>
           </a:xfrm>
           <a:prstGeom prst="rect">
             <a:avLst/>
@@ -1484,8 +336,8 @@
         </p:nvSpPr>
         <p:spPr>
           <a:xfrm>
-            <a:off x="0" y="8685213"/>
-            <a:ext cx="2971800" cy="457200"/>
+            <a:off x="0" y="9377316"/>
+            <a:ext cx="2945659" cy="493633"/>
           </a:xfrm>
           <a:prstGeom prst="rect">
             <a:avLst/>
@@ -1515,8 +367,8 @@
         </p:nvSpPr>
         <p:spPr>
           <a:xfrm>
-            <a:off x="3884613" y="8685213"/>
-            <a:ext cx="2971800" cy="457200"/>
+            <a:off x="3850443" y="9377316"/>
+            <a:ext cx="2945659" cy="493633"/>
           </a:xfrm>
           <a:prstGeom prst="rect">
             <a:avLst/>
@@ -1906,7 +758,7 @@
           <a:p>
             <a:fld id="{C474B4CA-5347-4033-9CF6-D10F59E92A5D}" type="datetimeFigureOut">
               <a:rPr kumimoji="1" lang="ja-JP" altLang="en-US" smtClean="0"/>
-              <a:t>2012/9/4</a:t>
+              <a:t>2012/9/6</a:t>
             </a:fld>
             <a:endParaRPr kumimoji="1" lang="ja-JP" altLang="en-US"/>
           </a:p>
@@ -2108,7 +960,7 @@
           <a:p>
             <a:fld id="{C474B4CA-5347-4033-9CF6-D10F59E92A5D}" type="datetimeFigureOut">
               <a:rPr kumimoji="1" lang="ja-JP" altLang="en-US" smtClean="0"/>
-              <a:t>2012/9/4</a:t>
+              <a:t>2012/9/6</a:t>
             </a:fld>
             <a:endParaRPr kumimoji="1" lang="ja-JP" altLang="en-US"/>
           </a:p>
@@ -2320,7 +1172,7 @@
           <a:p>
             <a:fld id="{C474B4CA-5347-4033-9CF6-D10F59E92A5D}" type="datetimeFigureOut">
               <a:rPr kumimoji="1" lang="ja-JP" altLang="en-US" smtClean="0"/>
-              <a:t>2012/9/4</a:t>
+              <a:t>2012/9/6</a:t>
             </a:fld>
             <a:endParaRPr kumimoji="1" lang="ja-JP" altLang="en-US"/>
           </a:p>
@@ -2522,7 +1374,7 @@
           <a:p>
             <a:fld id="{C474B4CA-5347-4033-9CF6-D10F59E92A5D}" type="datetimeFigureOut">
               <a:rPr kumimoji="1" lang="ja-JP" altLang="en-US" smtClean="0"/>
-              <a:t>2012/9/4</a:t>
+              <a:t>2012/9/6</a:t>
             </a:fld>
             <a:endParaRPr kumimoji="1" lang="ja-JP" altLang="en-US"/>
           </a:p>
@@ -2768,7 +1620,7 @@
           <a:p>
             <a:fld id="{C474B4CA-5347-4033-9CF6-D10F59E92A5D}" type="datetimeFigureOut">
               <a:rPr kumimoji="1" lang="ja-JP" altLang="en-US" smtClean="0"/>
-              <a:t>2012/9/4</a:t>
+              <a:t>2012/9/6</a:t>
             </a:fld>
             <a:endParaRPr kumimoji="1" lang="ja-JP" altLang="en-US"/>
           </a:p>
@@ -3120,7 +1972,7 @@
           <a:p>
             <a:fld id="{C474B4CA-5347-4033-9CF6-D10F59E92A5D}" type="datetimeFigureOut">
               <a:rPr kumimoji="1" lang="ja-JP" altLang="en-US" smtClean="0"/>
-              <a:t>2012/9/4</a:t>
+              <a:t>2012/9/6</a:t>
             </a:fld>
             <a:endParaRPr kumimoji="1" lang="ja-JP" altLang="en-US"/>
           </a:p>
@@ -3606,7 +2458,7 @@
           <a:p>
             <a:fld id="{C474B4CA-5347-4033-9CF6-D10F59E92A5D}" type="datetimeFigureOut">
               <a:rPr kumimoji="1" lang="ja-JP" altLang="en-US" smtClean="0"/>
-              <a:t>2012/9/4</a:t>
+              <a:t>2012/9/6</a:t>
             </a:fld>
             <a:endParaRPr kumimoji="1" lang="ja-JP" altLang="en-US"/>
           </a:p>
@@ -3724,7 +2576,7 @@
           <a:p>
             <a:fld id="{C474B4CA-5347-4033-9CF6-D10F59E92A5D}" type="datetimeFigureOut">
               <a:rPr kumimoji="1" lang="ja-JP" altLang="en-US" smtClean="0"/>
-              <a:t>2012/9/4</a:t>
+              <a:t>2012/9/6</a:t>
             </a:fld>
             <a:endParaRPr kumimoji="1" lang="ja-JP" altLang="en-US"/>
           </a:p>
@@ -3819,7 +2671,7 @@
           <a:p>
             <a:fld id="{C474B4CA-5347-4033-9CF6-D10F59E92A5D}" type="datetimeFigureOut">
               <a:rPr kumimoji="1" lang="ja-JP" altLang="en-US" smtClean="0"/>
-              <a:t>2012/9/4</a:t>
+              <a:t>2012/9/6</a:t>
             </a:fld>
             <a:endParaRPr kumimoji="1" lang="ja-JP" altLang="en-US"/>
           </a:p>
@@ -4128,7 +2980,7 @@
           <a:p>
             <a:fld id="{C474B4CA-5347-4033-9CF6-D10F59E92A5D}" type="datetimeFigureOut">
               <a:rPr kumimoji="1" lang="ja-JP" altLang="en-US" smtClean="0"/>
-              <a:t>2012/9/4</a:t>
+              <a:t>2012/9/6</a:t>
             </a:fld>
             <a:endParaRPr kumimoji="1" lang="ja-JP" altLang="en-US"/>
           </a:p>
@@ -4381,7 +3233,7 @@
           <a:p>
             <a:fld id="{C474B4CA-5347-4033-9CF6-D10F59E92A5D}" type="datetimeFigureOut">
               <a:rPr kumimoji="1" lang="ja-JP" altLang="en-US" smtClean="0"/>
-              <a:t>2012/9/4</a:t>
+              <a:t>2012/9/6</a:t>
             </a:fld>
             <a:endParaRPr kumimoji="1" lang="ja-JP" altLang="en-US"/>
           </a:p>
@@ -4626,7 +3478,7 @@
           <a:p>
             <a:fld id="{C474B4CA-5347-4033-9CF6-D10F59E92A5D}" type="datetimeFigureOut">
               <a:rPr kumimoji="1" lang="ja-JP" altLang="en-US" smtClean="0"/>
-              <a:t>2012/9/4</a:t>
+              <a:t>2012/9/6</a:t>
             </a:fld>
             <a:endParaRPr kumimoji="1" lang="ja-JP" altLang="en-US"/>
           </a:p>
@@ -5099,8 +3951,8 @@
         </p:blipFill>
         <p:spPr bwMode="auto">
           <a:xfrm>
-            <a:off x="9244688" y="6889861"/>
-            <a:ext cx="1264840" cy="1929667"/>
+            <a:off x="9106896" y="7627702"/>
+            <a:ext cx="1264840" cy="1158708"/>
           </a:xfrm>
           <a:prstGeom prst="rect">
             <a:avLst/>
@@ -5142,14 +3994,14 @@
       </p:pic>
       <p:sp>
         <p:nvSpPr>
-          <p:cNvPr id="6" name="テキスト ボックス 5"/>
+          <p:cNvPr id="15" name="テキスト ボックス 14"/>
           <p:cNvSpPr txBox="1"/>
           <p:nvPr/>
         </p:nvSpPr>
         <p:spPr>
           <a:xfrm>
-            <a:off x="681900" y="4487549"/>
-            <a:ext cx="3090607" cy="307777"/>
+            <a:off x="4812806" y="4470249"/>
+            <a:ext cx="3167112" cy="307777"/>
           </a:xfrm>
           <a:prstGeom prst="rect">
             <a:avLst/>
@@ -5163,12 +4015,12 @@
           <a:lstStyle/>
           <a:p>
             <a:r>
-              <a:rPr kumimoji="1" lang="ja-JP" altLang="en-US" sz="1400" b="1" dirty="0" smtClean="0">
-                <a:latin typeface="メイリオ" pitchFamily="50" charset="-128"/>
-                <a:ea typeface="メイリオ" pitchFamily="50" charset="-128"/>
-                <a:cs typeface="メイリオ" pitchFamily="50" charset="-128"/>
-              </a:rPr>
-              <a:t>モータの限界性能を引き出す工夫</a:t>
+              <a:rPr lang="ja-JP" altLang="en-US" sz="1400" b="1" dirty="0" smtClean="0">
+                <a:latin typeface="メイリオ" pitchFamily="50" charset="-128"/>
+                <a:ea typeface="メイリオ" pitchFamily="50" charset="-128"/>
+                <a:cs typeface="メイリオ" pitchFamily="50" charset="-128"/>
+              </a:rPr>
+              <a:t>高速走行における旋回量の補正</a:t>
             </a:r>
             <a:endParaRPr kumimoji="1" lang="ja-JP" altLang="en-US" sz="1400" b="1" dirty="0">
               <a:latin typeface="メイリオ" pitchFamily="50" charset="-128"/>
@@ -5180,14 +4032,14 @@
       </p:sp>
       <p:sp>
         <p:nvSpPr>
-          <p:cNvPr id="7" name="テキスト ボックス 6"/>
+          <p:cNvPr id="16" name="テキスト ボックス 15"/>
           <p:cNvSpPr txBox="1"/>
           <p:nvPr/>
         </p:nvSpPr>
         <p:spPr>
           <a:xfrm>
-            <a:off x="307505" y="5002957"/>
-            <a:ext cx="3893797" cy="1384995"/>
+            <a:off x="4480953" y="4908678"/>
+            <a:ext cx="3862308" cy="1384995"/>
           </a:xfrm>
           <a:prstGeom prst="rect">
             <a:avLst/>
@@ -5201,12 +4053,20 @@
           <a:lstStyle/>
           <a:p>
             <a:r>
+              <a:rPr lang="ja-JP" altLang="en-US" sz="1200" dirty="0">
+                <a:latin typeface="メイリオ" pitchFamily="50" charset="-128"/>
+                <a:ea typeface="メイリオ" pitchFamily="50" charset="-128"/>
+                <a:cs typeface="メイリオ" pitchFamily="50" charset="-128"/>
+              </a:rPr>
+              <a:t>　</a:t>
+            </a:r>
+            <a:r>
               <a:rPr lang="ja-JP" altLang="en-US" sz="1200" dirty="0" smtClean="0">
                 <a:latin typeface="メイリオ" pitchFamily="50" charset="-128"/>
                 <a:ea typeface="メイリオ" pitchFamily="50" charset="-128"/>
                 <a:cs typeface="メイリオ" pitchFamily="50" charset="-128"/>
               </a:rPr>
-              <a:t>　サーボモータにアクセスする</a:t>
+              <a:t>高速走行中のカーブでは算出された左右のモータの</a:t>
             </a:r>
             <a:r>
               <a:rPr lang="en-US" altLang="ja-JP" sz="1200" dirty="0" smtClean="0">
@@ -5214,6 +4074,22 @@
                 <a:ea typeface="メイリオ" pitchFamily="50" charset="-128"/>
                 <a:cs typeface="メイリオ" pitchFamily="50" charset="-128"/>
               </a:rPr>
+              <a:t>PWM</a:t>
+            </a:r>
+            <a:r>
+              <a:rPr lang="ja-JP" altLang="en-US" sz="1200" dirty="0" smtClean="0">
+                <a:latin typeface="メイリオ" pitchFamily="50" charset="-128"/>
+                <a:ea typeface="メイリオ" pitchFamily="50" charset="-128"/>
+                <a:cs typeface="メイリオ" pitchFamily="50" charset="-128"/>
+              </a:rPr>
+              <a:t>値が</a:t>
+            </a:r>
+            <a:r>
+              <a:rPr lang="en-US" altLang="ja-JP" sz="1200" dirty="0" smtClean="0">
+                <a:latin typeface="メイリオ" pitchFamily="50" charset="-128"/>
+                <a:ea typeface="メイリオ" pitchFamily="50" charset="-128"/>
+                <a:cs typeface="メイリオ" pitchFamily="50" charset="-128"/>
+              </a:rPr>
               <a:t>API</a:t>
             </a:r>
             <a:r>
@@ -5222,7 +4098,7 @@
                 <a:ea typeface="メイリオ" pitchFamily="50" charset="-128"/>
                 <a:cs typeface="メイリオ" pitchFamily="50" charset="-128"/>
               </a:rPr>
-              <a:t>は仕様上引数の</a:t>
+              <a:t>の入力範囲の超えることがある。その結果を単純に範囲に収まるように値を調整してしまうと、旋回量が不足し曲がり切れない。そこで、左右でモータの</a:t>
             </a:r>
             <a:r>
               <a:rPr lang="en-US" altLang="ja-JP" sz="1200" dirty="0" smtClean="0">
@@ -5238,282 +4114,7 @@
                 <a:ea typeface="メイリオ" pitchFamily="50" charset="-128"/>
                 <a:cs typeface="メイリオ" pitchFamily="50" charset="-128"/>
               </a:rPr>
-              <a:t>値として</a:t>
-            </a:r>
-            <a:r>
-              <a:rPr lang="en-US" altLang="ja-JP" sz="1200" dirty="0" smtClean="0">
-                <a:latin typeface="メイリオ" pitchFamily="50" charset="-128"/>
-                <a:ea typeface="メイリオ" pitchFamily="50" charset="-128"/>
-                <a:cs typeface="メイリオ" pitchFamily="50" charset="-128"/>
-              </a:rPr>
-              <a:t>-100</a:t>
-            </a:r>
-            <a:r>
-              <a:rPr lang="ja-JP" altLang="en-US" sz="1200" dirty="0" smtClean="0">
-                <a:latin typeface="メイリオ" pitchFamily="50" charset="-128"/>
-                <a:ea typeface="メイリオ" pitchFamily="50" charset="-128"/>
-                <a:cs typeface="メイリオ" pitchFamily="50" charset="-128"/>
-              </a:rPr>
-              <a:t>から</a:t>
-            </a:r>
-            <a:r>
-              <a:rPr lang="en-US" altLang="ja-JP" sz="1200" dirty="0" smtClean="0">
-                <a:latin typeface="メイリオ" pitchFamily="50" charset="-128"/>
-                <a:ea typeface="メイリオ" pitchFamily="50" charset="-128"/>
-                <a:cs typeface="メイリオ" pitchFamily="50" charset="-128"/>
-              </a:rPr>
-              <a:t>100</a:t>
-            </a:r>
-            <a:r>
-              <a:rPr lang="ja-JP" altLang="en-US" sz="1200" dirty="0" smtClean="0">
-                <a:latin typeface="メイリオ" pitchFamily="50" charset="-128"/>
-                <a:ea typeface="メイリオ" pitchFamily="50" charset="-128"/>
-                <a:cs typeface="メイリオ" pitchFamily="50" charset="-128"/>
-              </a:rPr>
-              <a:t>を渡されることを想定している。しかしながら、実際は符号付き</a:t>
-            </a:r>
-            <a:r>
-              <a:rPr lang="en-US" altLang="ja-JP" sz="1200" dirty="0" smtClean="0">
-                <a:latin typeface="メイリオ" pitchFamily="50" charset="-128"/>
-                <a:ea typeface="メイリオ" pitchFamily="50" charset="-128"/>
-                <a:cs typeface="メイリオ" pitchFamily="50" charset="-128"/>
-              </a:rPr>
-              <a:t>8</a:t>
-            </a:r>
-            <a:r>
-              <a:rPr lang="ja-JP" altLang="en-US" sz="1200" dirty="0" smtClean="0">
-                <a:latin typeface="メイリオ" pitchFamily="50" charset="-128"/>
-                <a:ea typeface="メイリオ" pitchFamily="50" charset="-128"/>
-                <a:cs typeface="メイリオ" pitchFamily="50" charset="-128"/>
-              </a:rPr>
-              <a:t>ビットの型を</a:t>
-            </a:r>
-            <a:r>
-              <a:rPr lang="en-US" altLang="ja-JP" sz="1200" dirty="0" smtClean="0">
-                <a:latin typeface="メイリオ" pitchFamily="50" charset="-128"/>
-                <a:ea typeface="メイリオ" pitchFamily="50" charset="-128"/>
-                <a:cs typeface="メイリオ" pitchFamily="50" charset="-128"/>
-              </a:rPr>
-              <a:t>PWM</a:t>
-            </a:r>
-            <a:r>
-              <a:rPr lang="ja-JP" altLang="en-US" sz="1200" dirty="0" smtClean="0">
-                <a:latin typeface="メイリオ" pitchFamily="50" charset="-128"/>
-                <a:ea typeface="メイリオ" pitchFamily="50" charset="-128"/>
-                <a:cs typeface="メイリオ" pitchFamily="50" charset="-128"/>
-              </a:rPr>
-              <a:t>値の引数としてとっているので、</a:t>
-            </a:r>
-            <a:r>
-              <a:rPr lang="en-US" altLang="ja-JP" sz="1200" dirty="0" smtClean="0">
-                <a:latin typeface="メイリオ" pitchFamily="50" charset="-128"/>
-                <a:ea typeface="メイリオ" pitchFamily="50" charset="-128"/>
-                <a:cs typeface="メイリオ" pitchFamily="50" charset="-128"/>
-              </a:rPr>
-              <a:t>-127</a:t>
-            </a:r>
-            <a:r>
-              <a:rPr lang="ja-JP" altLang="en-US" sz="1200" dirty="0" smtClean="0">
-                <a:latin typeface="メイリオ" pitchFamily="50" charset="-128"/>
-                <a:ea typeface="メイリオ" pitchFamily="50" charset="-128"/>
-                <a:cs typeface="メイリオ" pitchFamily="50" charset="-128"/>
-              </a:rPr>
-              <a:t>から</a:t>
-            </a:r>
-            <a:r>
-              <a:rPr lang="en-US" altLang="ja-JP" sz="1200" dirty="0" smtClean="0">
-                <a:latin typeface="メイリオ" pitchFamily="50" charset="-128"/>
-                <a:ea typeface="メイリオ" pitchFamily="50" charset="-128"/>
-                <a:cs typeface="メイリオ" pitchFamily="50" charset="-128"/>
-              </a:rPr>
-              <a:t>128</a:t>
-            </a:r>
-            <a:r>
-              <a:rPr lang="ja-JP" altLang="en-US" sz="1200" dirty="0" smtClean="0">
-                <a:latin typeface="メイリオ" pitchFamily="50" charset="-128"/>
-                <a:ea typeface="メイリオ" pitchFamily="50" charset="-128"/>
-                <a:cs typeface="メイリオ" pitchFamily="50" charset="-128"/>
-              </a:rPr>
-              <a:t>の値を入力することができる。よって旋回量の算出をこの範囲で行うことで、さらなる走行スピードの向上が可能となる。</a:t>
-            </a:r>
-            <a:endParaRPr kumimoji="1" lang="ja-JP" altLang="en-US" sz="1200" dirty="0">
-              <a:latin typeface="メイリオ" pitchFamily="50" charset="-128"/>
-              <a:ea typeface="メイリオ" pitchFamily="50" charset="-128"/>
-              <a:cs typeface="メイリオ" pitchFamily="50" charset="-128"/>
-            </a:endParaRPr>
-          </a:p>
-        </p:txBody>
-      </p:sp>
-      <p:sp>
-        <p:nvSpPr>
-          <p:cNvPr id="8" name="角丸四角形 7"/>
-          <p:cNvSpPr/>
-          <p:nvPr/>
-        </p:nvSpPr>
-        <p:spPr>
-          <a:xfrm>
-            <a:off x="280120" y="4310332"/>
-            <a:ext cx="3894169" cy="5012984"/>
-          </a:xfrm>
-          <a:prstGeom prst="roundRect">
-            <a:avLst/>
-          </a:prstGeom>
-          <a:noFill/>
-        </p:spPr>
-        <p:style>
-          <a:lnRef idx="2">
-            <a:schemeClr val="accent6"/>
-          </a:lnRef>
-          <a:fillRef idx="1">
-            <a:schemeClr val="lt1"/>
-          </a:fillRef>
-          <a:effectRef idx="0">
-            <a:schemeClr val="accent6"/>
-          </a:effectRef>
-          <a:fontRef idx="minor">
-            <a:schemeClr val="dk1"/>
-          </a:fontRef>
-        </p:style>
-        <p:txBody>
-          <a:bodyPr rtlCol="0" anchor="ctr"/>
-          <a:lstStyle/>
-          <a:p>
-            <a:pPr algn="ctr"/>
-            <a:endParaRPr kumimoji="1" lang="ja-JP" altLang="en-US" sz="1200"/>
-          </a:p>
-        </p:txBody>
-      </p:sp>
-      <p:sp>
-        <p:nvSpPr>
-          <p:cNvPr id="15" name="テキスト ボックス 14"/>
-          <p:cNvSpPr txBox="1"/>
-          <p:nvPr/>
-        </p:nvSpPr>
-        <p:spPr>
-          <a:xfrm>
-            <a:off x="4812806" y="4470249"/>
-            <a:ext cx="3167112" cy="307777"/>
-          </a:xfrm>
-          <a:prstGeom prst="rect">
-            <a:avLst/>
-          </a:prstGeom>
-          <a:noFill/>
-        </p:spPr>
-        <p:txBody>
-          <a:bodyPr wrap="square" rtlCol="0">
-            <a:spAutoFit/>
-          </a:bodyPr>
-          <a:lstStyle/>
-          <a:p>
-            <a:r>
-              <a:rPr lang="ja-JP" altLang="en-US" sz="1400" b="1" dirty="0" smtClean="0">
-                <a:latin typeface="メイリオ" pitchFamily="50" charset="-128"/>
-                <a:ea typeface="メイリオ" pitchFamily="50" charset="-128"/>
-                <a:cs typeface="メイリオ" pitchFamily="50" charset="-128"/>
-              </a:rPr>
-              <a:t>高速走行における旋回量の補正</a:t>
-            </a:r>
-            <a:endParaRPr kumimoji="1" lang="ja-JP" altLang="en-US" sz="1400" b="1" dirty="0">
-              <a:latin typeface="メイリオ" pitchFamily="50" charset="-128"/>
-              <a:ea typeface="メイリオ" pitchFamily="50" charset="-128"/>
-              <a:cs typeface="メイリオ" pitchFamily="50" charset="-128"/>
-            </a:endParaRPr>
-          </a:p>
-        </p:txBody>
-      </p:sp>
-      <p:sp>
-        <p:nvSpPr>
-          <p:cNvPr id="16" name="テキスト ボックス 15"/>
-          <p:cNvSpPr txBox="1"/>
-          <p:nvPr/>
-        </p:nvSpPr>
-        <p:spPr>
-          <a:xfrm>
-            <a:off x="4480953" y="4908678"/>
-            <a:ext cx="3862308" cy="1384995"/>
-          </a:xfrm>
-          <a:prstGeom prst="rect">
-            <a:avLst/>
-          </a:prstGeom>
-          <a:noFill/>
-        </p:spPr>
-        <p:txBody>
-          <a:bodyPr wrap="square" rtlCol="0">
-            <a:spAutoFit/>
-          </a:bodyPr>
-          <a:lstStyle/>
-          <a:p>
-            <a:r>
-              <a:rPr lang="ja-JP" altLang="en-US" sz="1200" dirty="0">
-                <a:latin typeface="メイリオ" pitchFamily="50" charset="-128"/>
-                <a:ea typeface="メイリオ" pitchFamily="50" charset="-128"/>
-                <a:cs typeface="メイリオ" pitchFamily="50" charset="-128"/>
-              </a:rPr>
-              <a:t>　</a:t>
-            </a:r>
-            <a:r>
-              <a:rPr lang="ja-JP" altLang="en-US" sz="1200" dirty="0" smtClean="0">
-                <a:latin typeface="メイリオ" pitchFamily="50" charset="-128"/>
-                <a:ea typeface="メイリオ" pitchFamily="50" charset="-128"/>
-                <a:cs typeface="メイリオ" pitchFamily="50" charset="-128"/>
-              </a:rPr>
-              <a:t>高速走行中のカーブでは算出された左右のモータの</a:t>
-            </a:r>
-            <a:r>
-              <a:rPr lang="en-US" altLang="ja-JP" sz="1200" dirty="0" smtClean="0">
-                <a:latin typeface="メイリオ" pitchFamily="50" charset="-128"/>
-                <a:ea typeface="メイリオ" pitchFamily="50" charset="-128"/>
-                <a:cs typeface="メイリオ" pitchFamily="50" charset="-128"/>
-              </a:rPr>
-              <a:t>PWM</a:t>
-            </a:r>
-            <a:r>
-              <a:rPr lang="ja-JP" altLang="en-US" sz="1200" dirty="0" smtClean="0">
-                <a:latin typeface="メイリオ" pitchFamily="50" charset="-128"/>
-                <a:ea typeface="メイリオ" pitchFamily="50" charset="-128"/>
-                <a:cs typeface="メイリオ" pitchFamily="50" charset="-128"/>
-              </a:rPr>
-              <a:t>値が</a:t>
-            </a:r>
-            <a:r>
-              <a:rPr lang="en-US" altLang="ja-JP" sz="1200" dirty="0" smtClean="0">
-                <a:latin typeface="メイリオ" pitchFamily="50" charset="-128"/>
-                <a:ea typeface="メイリオ" pitchFamily="50" charset="-128"/>
-                <a:cs typeface="メイリオ" pitchFamily="50" charset="-128"/>
-              </a:rPr>
-              <a:t>API</a:t>
-            </a:r>
-            <a:r>
-              <a:rPr lang="ja-JP" altLang="en-US" sz="1200" dirty="0" smtClean="0">
-                <a:latin typeface="メイリオ" pitchFamily="50" charset="-128"/>
-                <a:ea typeface="メイリオ" pitchFamily="50" charset="-128"/>
-                <a:cs typeface="メイリオ" pitchFamily="50" charset="-128"/>
-              </a:rPr>
-              <a:t>の入力範囲の超えることがある。その結果を単純に範囲に収まるように値を調整してしまうと、旋回量が不足し曲がり切れない。そこで、左右でモータの</a:t>
-            </a:r>
-            <a:r>
-              <a:rPr lang="en-US" altLang="ja-JP" sz="1200" dirty="0" smtClean="0">
-                <a:latin typeface="メイリオ" pitchFamily="50" charset="-128"/>
-                <a:ea typeface="メイリオ" pitchFamily="50" charset="-128"/>
-                <a:cs typeface="メイリオ" pitchFamily="50" charset="-128"/>
-              </a:rPr>
-              <a:t>PWM</a:t>
-            </a:r>
-            <a:r>
-              <a:rPr lang="ja-JP" altLang="en-US" sz="1200" dirty="0" smtClean="0">
-                <a:latin typeface="メイリオ" pitchFamily="50" charset="-128"/>
-                <a:ea typeface="メイリオ" pitchFamily="50" charset="-128"/>
-                <a:cs typeface="メイリオ" pitchFamily="50" charset="-128"/>
-              </a:rPr>
-              <a:t>値が規定量を超えたら、それを反対側のモータの制御量に反映させることで高速走行に</a:t>
-            </a:r>
-            <a:r>
-              <a:rPr lang="ja-JP" altLang="en-US" sz="1200" dirty="0" smtClean="0">
-                <a:latin typeface="メイリオ" pitchFamily="50" charset="-128"/>
-                <a:ea typeface="メイリオ" pitchFamily="50" charset="-128"/>
-                <a:cs typeface="メイリオ" pitchFamily="50" charset="-128"/>
-              </a:rPr>
-              <a:t>おける</a:t>
+              <a:t>値が規定量を超えたら、それを反対側のモータの制御量に反映させることで高速走行における</a:t>
             </a:r>
             <a:r>
               <a:rPr lang="ja-JP" altLang="en-US" sz="1200" dirty="0">
@@ -7430,7 +6031,7 @@
         </p:nvSpPr>
         <p:spPr>
           <a:xfrm>
-            <a:off x="7594176" y="6983690"/>
+            <a:off x="7600167" y="6830454"/>
             <a:ext cx="795780" cy="600164"/>
           </a:xfrm>
           <a:prstGeom prst="rect">
@@ -7498,40 +6099,16 @@
           </a:p>
         </p:txBody>
       </p:sp>
-      <p:graphicFrame>
-        <p:nvGraphicFramePr>
-          <p:cNvPr id="55" name="グラフ 54"/>
-          <p:cNvGraphicFramePr>
-            <a:graphicFrameLocks/>
-          </p:cNvGraphicFramePr>
-          <p:nvPr>
-            <p:extLst>
-              <p:ext uri="{D42A27DB-BD31-4B8C-83A1-F6EECF244321}">
-                <p14:modId xmlns:p14="http://schemas.microsoft.com/office/powerpoint/2010/main" val="2123810203"/>
-              </p:ext>
-            </p:extLst>
-          </p:nvPr>
-        </p:nvGraphicFramePr>
-        <p:xfrm>
-          <a:off x="496144" y="6604099"/>
-          <a:ext cx="3600400" cy="2509672"/>
-        </p:xfrm>
-        <a:graphic>
-          <a:graphicData uri="http://schemas.openxmlformats.org/drawingml/2006/chart">
-            <c:chart xmlns:c="http://schemas.openxmlformats.org/drawingml/2006/chart" xmlns:r="http://schemas.openxmlformats.org/officeDocument/2006/relationships" r:id="rId4"/>
-          </a:graphicData>
-        </a:graphic>
-      </p:graphicFrame>
-      <p:sp>
-        <p:nvSpPr>
-          <p:cNvPr id="2" name="テキスト ボックス 1"/>
+      <p:sp>
+        <p:nvSpPr>
+          <p:cNvPr id="57" name="テキスト ボックス 56"/>
           <p:cNvSpPr txBox="1"/>
           <p:nvPr/>
         </p:nvSpPr>
         <p:spPr>
-          <a:xfrm rot="2563830">
-            <a:off x="1144578" y="6123226"/>
-            <a:ext cx="2165251" cy="1446550"/>
+          <a:xfrm>
+            <a:off x="9785176" y="4470249"/>
+            <a:ext cx="1800200" cy="307777"/>
           </a:xfrm>
           <a:prstGeom prst="rect">
             <a:avLst/>
@@ -7545,50 +6122,20 @@
           <a:lstStyle/>
           <a:p>
             <a:r>
-              <a:rPr kumimoji="1" lang="ja-JP" altLang="en-US" sz="8800" dirty="0" smtClean="0">
-                <a:solidFill>
-                  <a:srgbClr val="FFC000"/>
-                </a:solidFill>
-              </a:rPr>
-              <a:t>誤り</a:t>
-            </a:r>
-            <a:endParaRPr kumimoji="1" lang="ja-JP" altLang="en-US" sz="8800" dirty="0">
-              <a:solidFill>
-                <a:srgbClr val="FFC000"/>
-              </a:solidFill>
-            </a:endParaRPr>
-          </a:p>
-        </p:txBody>
-      </p:sp>
-      <p:sp>
-        <p:nvSpPr>
-          <p:cNvPr id="57" name="テキスト ボックス 56"/>
-          <p:cNvSpPr txBox="1"/>
-          <p:nvPr/>
-        </p:nvSpPr>
-        <p:spPr>
-          <a:xfrm>
-            <a:off x="9785176" y="4470249"/>
-            <a:ext cx="1800200" cy="307777"/>
-          </a:xfrm>
-          <a:prstGeom prst="rect">
-            <a:avLst/>
-          </a:prstGeom>
-          <a:noFill/>
-        </p:spPr>
-        <p:txBody>
-          <a:bodyPr wrap="square" rtlCol="0">
-            <a:spAutoFit/>
-          </a:bodyPr>
-          <a:lstStyle/>
-          <a:p>
-            <a:r>
               <a:rPr kumimoji="1" lang="ja-JP" altLang="en-US" sz="1400" b="1" dirty="0" smtClean="0">
                 <a:latin typeface="メイリオ" pitchFamily="50" charset="-128"/>
                 <a:ea typeface="メイリオ" pitchFamily="50" charset="-128"/>
                 <a:cs typeface="メイリオ" pitchFamily="50" charset="-128"/>
               </a:rPr>
-              <a:t>ライン復帰の技術</a:t>
+              <a:t>ライン</a:t>
+            </a:r>
+            <a:r>
+              <a:rPr kumimoji="1" lang="ja-JP" altLang="en-US" sz="1400" b="1" dirty="0" smtClean="0">
+                <a:latin typeface="メイリオ" pitchFamily="50" charset="-128"/>
+                <a:ea typeface="メイリオ" pitchFamily="50" charset="-128"/>
+                <a:cs typeface="メイリオ" pitchFamily="50" charset="-128"/>
+              </a:rPr>
+              <a:t>復帰の技術</a:t>
             </a:r>
             <a:endParaRPr kumimoji="1" lang="ja-JP" altLang="en-US" sz="1400" b="1" dirty="0">
               <a:latin typeface="メイリオ" pitchFamily="50" charset="-128"/>
@@ -7606,8 +6153,8 @@
         </p:nvSpPr>
         <p:spPr>
           <a:xfrm>
-            <a:off x="8691541" y="4919422"/>
-            <a:ext cx="3862308" cy="1461939"/>
+            <a:off x="8704348" y="4778026"/>
+            <a:ext cx="3862308" cy="1277273"/>
           </a:xfrm>
           <a:prstGeom prst="rect">
             <a:avLst/>
@@ -7621,20 +6168,12 @@
           <a:lstStyle/>
           <a:p>
             <a:r>
-              <a:rPr lang="ja-JP" altLang="en-US" sz="1200" dirty="0">
-                <a:latin typeface="メイリオ" pitchFamily="50" charset="-128"/>
-                <a:ea typeface="メイリオ" pitchFamily="50" charset="-128"/>
-                <a:cs typeface="メイリオ" pitchFamily="50" charset="-128"/>
-              </a:rPr>
-              <a:t>　</a:t>
-            </a:r>
-            <a:r>
               <a:rPr lang="ja-JP" altLang="en-US" sz="1100" dirty="0" smtClean="0">
                 <a:latin typeface="メイリオ" pitchFamily="50" charset="-128"/>
                 <a:ea typeface="メイリオ" pitchFamily="50" charset="-128"/>
                 <a:cs typeface="メイリオ" pitchFamily="50" charset="-128"/>
               </a:rPr>
-              <a:t>階段やシーソをクリア後、段差を降りる衝撃で走行体の姿勢が崩れ</a:t>
+              <a:t>階段の段差などを</a:t>
             </a:r>
             <a:r>
               <a:rPr lang="ja-JP" altLang="en-US" sz="1100" dirty="0" smtClean="0">
@@ -7642,7 +6181,7 @@
                 <a:ea typeface="メイリオ" pitchFamily="50" charset="-128"/>
                 <a:cs typeface="メイリオ" pitchFamily="50" charset="-128"/>
               </a:rPr>
-              <a:t>、ライン</a:t>
+              <a:t>降りる衝撃で走行体の姿勢が崩れ、ラインを見失って</a:t>
             </a:r>
             <a:r>
               <a:rPr lang="ja-JP" altLang="en-US" sz="1100" dirty="0" smtClean="0">
@@ -7650,7 +6189,7 @@
                 <a:ea typeface="メイリオ" pitchFamily="50" charset="-128"/>
                 <a:cs typeface="メイリオ" pitchFamily="50" charset="-128"/>
               </a:rPr>
-              <a:t>を見失ってしまうケースが多く見られる。そこで、ラインを再び見つけライントレースを再開する必要がある。そこで、</a:t>
+              <a:t>しまう</a:t>
             </a:r>
             <a:r>
               <a:rPr lang="ja-JP" altLang="en-US" sz="1100" dirty="0">
@@ -7658,7 +6197,7 @@
                 <a:ea typeface="メイリオ" pitchFamily="50" charset="-128"/>
                 <a:cs typeface="メイリオ" pitchFamily="50" charset="-128"/>
               </a:rPr>
-              <a:t>しかし、難所クリア直後の走行</a:t>
+              <a:t>こと</a:t>
             </a:r>
             <a:r>
               <a:rPr lang="ja-JP" altLang="en-US" sz="1100" dirty="0" smtClean="0">
@@ -7666,7 +6205,151 @@
                 <a:ea typeface="メイリオ" pitchFamily="50" charset="-128"/>
                 <a:cs typeface="メイリオ" pitchFamily="50" charset="-128"/>
               </a:rPr>
-              <a:t>ログから自分がラインからどちら側にどれだけ離れているかを識別するのは誤差が多く入り込む危険性がある。そこで、ラインの左右どちらに外れてしまっても復帰できるようにすることが必要であると考えた。</a:t>
+              <a:t>が頻繁にある。</a:t>
+            </a:r>
+            <a:r>
+              <a:rPr lang="ja-JP" altLang="en-US" sz="1100" dirty="0" smtClean="0">
+                <a:latin typeface="メイリオ" pitchFamily="50" charset="-128"/>
+                <a:ea typeface="メイリオ" pitchFamily="50" charset="-128"/>
+                <a:cs typeface="メイリオ" pitchFamily="50" charset="-128"/>
+              </a:rPr>
+              <a:t>そこ</a:t>
+            </a:r>
+            <a:r>
+              <a:rPr lang="ja-JP" altLang="en-US" sz="1100" dirty="0" smtClean="0">
+                <a:latin typeface="メイリオ" pitchFamily="50" charset="-128"/>
+                <a:ea typeface="メイリオ" pitchFamily="50" charset="-128"/>
+                <a:cs typeface="メイリオ" pitchFamily="50" charset="-128"/>
+              </a:rPr>
+              <a:t>で、ライン</a:t>
+            </a:r>
+            <a:r>
+              <a:rPr lang="ja-JP" altLang="en-US" sz="1100" dirty="0" smtClean="0">
+                <a:latin typeface="メイリオ" pitchFamily="50" charset="-128"/>
+                <a:ea typeface="メイリオ" pitchFamily="50" charset="-128"/>
+                <a:cs typeface="メイリオ" pitchFamily="50" charset="-128"/>
+              </a:rPr>
+              <a:t>を</a:t>
+            </a:r>
+            <a:r>
+              <a:rPr lang="ja-JP" altLang="en-US" sz="1100" dirty="0" smtClean="0">
+                <a:latin typeface="メイリオ" pitchFamily="50" charset="-128"/>
+                <a:ea typeface="メイリオ" pitchFamily="50" charset="-128"/>
+                <a:cs typeface="メイリオ" pitchFamily="50" charset="-128"/>
+              </a:rPr>
+              <a:t>探し出し復帰</a:t>
+            </a:r>
+            <a:r>
+              <a:rPr lang="ja-JP" altLang="en-US" sz="1100" dirty="0">
+                <a:latin typeface="メイリオ" pitchFamily="50" charset="-128"/>
+                <a:ea typeface="メイリオ" pitchFamily="50" charset="-128"/>
+                <a:cs typeface="メイリオ" pitchFamily="50" charset="-128"/>
+              </a:rPr>
+              <a:t>する</a:t>
+            </a:r>
+            <a:r>
+              <a:rPr lang="ja-JP" altLang="en-US" sz="1100" dirty="0" smtClean="0">
+                <a:latin typeface="メイリオ" pitchFamily="50" charset="-128"/>
+                <a:ea typeface="メイリオ" pitchFamily="50" charset="-128"/>
+                <a:cs typeface="メイリオ" pitchFamily="50" charset="-128"/>
+              </a:rPr>
+              <a:t>必要</a:t>
+            </a:r>
+            <a:r>
+              <a:rPr lang="ja-JP" altLang="en-US" sz="1100" dirty="0" smtClean="0">
+                <a:latin typeface="メイリオ" pitchFamily="50" charset="-128"/>
+                <a:ea typeface="メイリオ" pitchFamily="50" charset="-128"/>
+                <a:cs typeface="メイリオ" pitchFamily="50" charset="-128"/>
+              </a:rPr>
+              <a:t>がある</a:t>
+            </a:r>
+            <a:r>
+              <a:rPr lang="ja-JP" altLang="en-US" sz="1100" dirty="0" smtClean="0">
+                <a:latin typeface="メイリオ" pitchFamily="50" charset="-128"/>
+                <a:ea typeface="メイリオ" pitchFamily="50" charset="-128"/>
+                <a:cs typeface="メイリオ" pitchFamily="50" charset="-128"/>
+              </a:rPr>
+              <a:t>。しかし</a:t>
+            </a:r>
+            <a:r>
+              <a:rPr lang="ja-JP" altLang="en-US" sz="1100" dirty="0">
+                <a:latin typeface="メイリオ" pitchFamily="50" charset="-128"/>
+                <a:ea typeface="メイリオ" pitchFamily="50" charset="-128"/>
+                <a:cs typeface="メイリオ" pitchFamily="50" charset="-128"/>
+              </a:rPr>
+              <a:t>、難所</a:t>
+            </a:r>
+            <a:r>
+              <a:rPr lang="ja-JP" altLang="en-US" sz="1100" dirty="0" smtClean="0">
+                <a:latin typeface="メイリオ" pitchFamily="50" charset="-128"/>
+                <a:ea typeface="メイリオ" pitchFamily="50" charset="-128"/>
+                <a:cs typeface="メイリオ" pitchFamily="50" charset="-128"/>
+              </a:rPr>
+              <a:t>クリア後</a:t>
+            </a:r>
+            <a:r>
+              <a:rPr lang="ja-JP" altLang="en-US" sz="1100" dirty="0">
+                <a:latin typeface="メイリオ" pitchFamily="50" charset="-128"/>
+                <a:ea typeface="メイリオ" pitchFamily="50" charset="-128"/>
+                <a:cs typeface="メイリオ" pitchFamily="50" charset="-128"/>
+              </a:rPr>
+              <a:t>の走行</a:t>
+            </a:r>
+            <a:r>
+              <a:rPr lang="ja-JP" altLang="en-US" sz="1100" dirty="0" smtClean="0">
+                <a:latin typeface="メイリオ" pitchFamily="50" charset="-128"/>
+                <a:ea typeface="メイリオ" pitchFamily="50" charset="-128"/>
+                <a:cs typeface="メイリオ" pitchFamily="50" charset="-128"/>
+              </a:rPr>
+              <a:t>ログ</a:t>
+            </a:r>
+            <a:r>
+              <a:rPr lang="ja-JP" altLang="en-US" sz="1100" dirty="0" smtClean="0">
+                <a:latin typeface="メイリオ" pitchFamily="50" charset="-128"/>
+                <a:ea typeface="メイリオ" pitchFamily="50" charset="-128"/>
+                <a:cs typeface="メイリオ" pitchFamily="50" charset="-128"/>
+              </a:rPr>
+              <a:t>から自己位置推定するには誤差</a:t>
+            </a:r>
+            <a:r>
+              <a:rPr lang="ja-JP" altLang="en-US" sz="1100" dirty="0" smtClean="0">
+                <a:latin typeface="メイリオ" pitchFamily="50" charset="-128"/>
+                <a:ea typeface="メイリオ" pitchFamily="50" charset="-128"/>
+                <a:cs typeface="メイリオ" pitchFamily="50" charset="-128"/>
+              </a:rPr>
+              <a:t>が</a:t>
+            </a:r>
+            <a:r>
+              <a:rPr lang="ja-JP" altLang="en-US" sz="1100" dirty="0" smtClean="0">
+                <a:latin typeface="メイリオ" pitchFamily="50" charset="-128"/>
+                <a:ea typeface="メイリオ" pitchFamily="50" charset="-128"/>
+                <a:cs typeface="メイリオ" pitchFamily="50" charset="-128"/>
+              </a:rPr>
+              <a:t>多く意図しない動作をする可能性がある。自己位置推定に頼らずライン</a:t>
+            </a:r>
+            <a:r>
+              <a:rPr lang="ja-JP" altLang="en-US" sz="1100" dirty="0" smtClean="0">
+                <a:latin typeface="メイリオ" pitchFamily="50" charset="-128"/>
+                <a:ea typeface="メイリオ" pitchFamily="50" charset="-128"/>
+                <a:cs typeface="メイリオ" pitchFamily="50" charset="-128"/>
+              </a:rPr>
+              <a:t>の左右どちらに外れてしまっても復帰できるように</a:t>
+            </a:r>
+            <a:r>
+              <a:rPr lang="ja-JP" altLang="en-US" sz="1100" dirty="0" smtClean="0">
+                <a:latin typeface="メイリオ" pitchFamily="50" charset="-128"/>
+                <a:ea typeface="メイリオ" pitchFamily="50" charset="-128"/>
+                <a:cs typeface="メイリオ" pitchFamily="50" charset="-128"/>
+              </a:rPr>
+              <a:t>する</a:t>
+            </a:r>
+            <a:r>
+              <a:rPr lang="ja-JP" altLang="en-US" sz="1100" dirty="0" smtClean="0">
+                <a:latin typeface="メイリオ" pitchFamily="50" charset="-128"/>
+                <a:ea typeface="メイリオ" pitchFamily="50" charset="-128"/>
+                <a:cs typeface="メイリオ" pitchFamily="50" charset="-128"/>
+              </a:rPr>
+              <a:t>必要がある。</a:t>
             </a:r>
             <a:endParaRPr kumimoji="1" lang="ja-JP" altLang="en-US" sz="1100" dirty="0">
               <a:latin typeface="メイリオ" pitchFamily="50" charset="-128"/>
@@ -7729,7 +6412,7 @@
           <a:prstGeom prst="arc">
             <a:avLst>
               <a:gd name="adj1" fmla="val 16200000"/>
-              <a:gd name="adj2" fmla="val 19886047"/>
+              <a:gd name="adj2" fmla="val 18724426"/>
             </a:avLst>
           </a:prstGeom>
           <a:ln w="25400" cap="rnd">
@@ -7785,8 +6468,8 @@
         </p:blipFill>
         <p:spPr bwMode="auto">
           <a:xfrm>
-            <a:off x="10747085" y="6889861"/>
-            <a:ext cx="1264840" cy="1903791"/>
+            <a:off x="10772775" y="7679181"/>
+            <a:ext cx="1239150" cy="1114471"/>
           </a:xfrm>
           <a:prstGeom prst="rect">
             <a:avLst/>
@@ -7834,7 +6517,7 @@
         </p:nvSpPr>
         <p:spPr>
           <a:xfrm>
-            <a:off x="11668874" y="8397183"/>
+            <a:off x="11696164" y="8594137"/>
             <a:ext cx="144016" cy="160735"/>
           </a:xfrm>
           <a:prstGeom prst="ellipse">
@@ -7880,7 +6563,7 @@
         </p:nvSpPr>
         <p:spPr>
           <a:xfrm rot="4063690">
-            <a:off x="10826482" y="8098632"/>
+            <a:off x="10874281" y="8297671"/>
             <a:ext cx="914400" cy="914400"/>
           </a:xfrm>
           <a:prstGeom prst="arc">
@@ -7928,7 +6611,7 @@
         </p:nvSpPr>
         <p:spPr>
           <a:xfrm rot="15059816">
-            <a:off x="10864331" y="8031287"/>
+            <a:off x="10925696" y="8247549"/>
             <a:ext cx="934303" cy="914400"/>
           </a:xfrm>
           <a:prstGeom prst="arc">
@@ -7978,14 +6661,17 @@
         </p:nvCxnSpPr>
         <p:spPr>
           <a:xfrm flipH="1" flipV="1">
-            <a:off x="11404928" y="7838049"/>
+            <a:off x="11466293" y="8054311"/>
             <a:ext cx="230232" cy="305490"/>
           </a:xfrm>
           <a:prstGeom prst="straightConnector1">
             <a:avLst/>
           </a:prstGeom>
           <a:ln w="19050">
-            <a:tailEnd type="arrow"/>
+            <a:solidFill>
+              <a:srgbClr val="0070C0"/>
+            </a:solidFill>
+            <a:tailEnd type="triangle"/>
           </a:ln>
         </p:spPr>
         <p:style>
@@ -8011,14 +6697,17 @@
         </p:nvCxnSpPr>
         <p:spPr>
           <a:xfrm flipV="1">
-            <a:off x="11404928" y="7536575"/>
+            <a:off x="11446086" y="7781052"/>
             <a:ext cx="0" cy="305490"/>
           </a:xfrm>
           <a:prstGeom prst="straightConnector1">
             <a:avLst/>
           </a:prstGeom>
           <a:ln w="19050">
-            <a:tailEnd type="arrow"/>
+            <a:solidFill>
+              <a:srgbClr val="0070C0"/>
+            </a:solidFill>
+            <a:tailEnd type="triangle"/>
           </a:ln>
         </p:spPr>
         <p:style>
@@ -8186,14 +6875,17 @@
         </p:nvCxnSpPr>
         <p:spPr>
           <a:xfrm flipV="1">
-            <a:off x="9932790" y="7813316"/>
-            <a:ext cx="0" cy="305490"/>
+            <a:off x="9808164" y="7936672"/>
+            <a:ext cx="0" cy="269596"/>
           </a:xfrm>
           <a:prstGeom prst="straightConnector1">
             <a:avLst/>
           </a:prstGeom>
-          <a:ln w="19050">
-            <a:tailEnd type="arrow"/>
+          <a:ln w="25400">
+            <a:solidFill>
+              <a:srgbClr val="0070C0"/>
+            </a:solidFill>
+            <a:tailEnd type="triangle"/>
           </a:ln>
         </p:spPr>
         <p:style>
@@ -8295,7 +6987,7 @@
         </p:nvSpPr>
         <p:spPr>
           <a:xfrm>
-            <a:off x="11378805" y="8243294"/>
+            <a:off x="11446620" y="8532042"/>
             <a:ext cx="359074" cy="307777"/>
           </a:xfrm>
           <a:prstGeom prst="rect">
@@ -8371,7 +7063,7 @@
         </p:nvSpPr>
         <p:spPr>
           <a:xfrm>
-            <a:off x="11059445" y="7782702"/>
+            <a:off x="11068007" y="8024479"/>
             <a:ext cx="353145" cy="307777"/>
           </a:xfrm>
           <a:prstGeom prst="rect">
@@ -8409,7 +7101,7 @@
         </p:nvSpPr>
         <p:spPr>
           <a:xfrm>
-            <a:off x="11459745" y="7825186"/>
+            <a:off x="11547577" y="8053667"/>
             <a:ext cx="353145" cy="307777"/>
           </a:xfrm>
           <a:prstGeom prst="rect">
@@ -8447,7 +7139,7 @@
         </p:nvSpPr>
         <p:spPr>
           <a:xfrm>
-            <a:off x="9869713" y="7835762"/>
+            <a:off x="9756217" y="7948410"/>
             <a:ext cx="353145" cy="307777"/>
           </a:xfrm>
           <a:prstGeom prst="rect">
@@ -8467,7 +7159,7 @@
                 <a:ea typeface="メイリオ" pitchFamily="50" charset="-128"/>
                 <a:cs typeface="メイリオ" pitchFamily="50" charset="-128"/>
               </a:rPr>
-              <a:t>③</a:t>
+              <a:t>④</a:t>
             </a:r>
             <a:endParaRPr kumimoji="1" lang="ja-JP" altLang="en-US" sz="1400" dirty="0">
               <a:latin typeface="メイリオ" pitchFamily="50" charset="-128"/>
@@ -8485,7 +7177,7 @@
         </p:nvSpPr>
         <p:spPr>
           <a:xfrm>
-            <a:off x="11387737" y="7545286"/>
+            <a:off x="11379505" y="7687925"/>
             <a:ext cx="353145" cy="307777"/>
           </a:xfrm>
           <a:prstGeom prst="rect">
@@ -8569,7 +7261,7 @@
         </p:nvSpPr>
         <p:spPr>
           <a:xfrm>
-            <a:off x="8873334" y="6592362"/>
+            <a:off x="8818971" y="6179712"/>
             <a:ext cx="1813977" cy="261610"/>
           </a:xfrm>
           <a:prstGeom prst="rect">
@@ -8589,23 +7281,7 @@
                 <a:ea typeface="メイリオ" pitchFamily="50" charset="-128"/>
                 <a:cs typeface="メイリオ" pitchFamily="50" charset="-128"/>
               </a:rPr>
-              <a:t>ライン</a:t>
-            </a:r>
-            <a:r>
-              <a:rPr lang="ja-JP" altLang="en-US" sz="1100" b="1" dirty="0" smtClean="0">
-                <a:latin typeface="メイリオ" pitchFamily="50" charset="-128"/>
-                <a:ea typeface="メイリオ" pitchFamily="50" charset="-128"/>
-                <a:cs typeface="メイリオ" pitchFamily="50" charset="-128"/>
-              </a:rPr>
-              <a:t>左側に</a:t>
-            </a:r>
-            <a:r>
-              <a:rPr lang="ja-JP" altLang="en-US" sz="1100" b="1" dirty="0" smtClean="0">
-                <a:latin typeface="メイリオ" pitchFamily="50" charset="-128"/>
-                <a:ea typeface="メイリオ" pitchFamily="50" charset="-128"/>
-                <a:cs typeface="メイリオ" pitchFamily="50" charset="-128"/>
-              </a:rPr>
-              <a:t>落ちた場合</a:t>
+              <a:t>ライン左側に落ちた場合</a:t>
             </a:r>
             <a:endParaRPr kumimoji="1" lang="ja-JP" altLang="en-US" sz="1100" b="1" dirty="0">
               <a:latin typeface="メイリオ" pitchFamily="50" charset="-128"/>
@@ -8623,7 +7299,7 @@
         </p:nvSpPr>
         <p:spPr>
           <a:xfrm>
-            <a:off x="10638444" y="6584891"/>
+            <a:off x="10686567" y="6173298"/>
             <a:ext cx="1739020" cy="261610"/>
           </a:xfrm>
           <a:prstGeom prst="rect">
@@ -8643,23 +7319,7 @@
                 <a:ea typeface="メイリオ" pitchFamily="50" charset="-128"/>
                 <a:cs typeface="メイリオ" pitchFamily="50" charset="-128"/>
               </a:rPr>
-              <a:t>ライン</a:t>
-            </a:r>
-            <a:r>
-              <a:rPr lang="ja-JP" altLang="en-US" sz="1100" b="1" dirty="0" smtClean="0">
-                <a:latin typeface="メイリオ" pitchFamily="50" charset="-128"/>
-                <a:ea typeface="メイリオ" pitchFamily="50" charset="-128"/>
-                <a:cs typeface="メイリオ" pitchFamily="50" charset="-128"/>
-              </a:rPr>
-              <a:t>右側に</a:t>
-            </a:r>
-            <a:r>
-              <a:rPr lang="ja-JP" altLang="en-US" sz="1100" b="1" dirty="0" smtClean="0">
-                <a:latin typeface="メイリオ" pitchFamily="50" charset="-128"/>
-                <a:ea typeface="メイリオ" pitchFamily="50" charset="-128"/>
-                <a:cs typeface="メイリオ" pitchFamily="50" charset="-128"/>
-              </a:rPr>
-              <a:t>落ちた場合</a:t>
+              <a:t>ライン右側に落ちた場合</a:t>
             </a:r>
             <a:endParaRPr kumimoji="1" lang="ja-JP" altLang="en-US" sz="1100" b="1" dirty="0">
               <a:latin typeface="メイリオ" pitchFamily="50" charset="-128"/>
@@ -8958,6 +7618,304 @@
           <a:p>
             <a:pPr algn="ctr"/>
             <a:endParaRPr kumimoji="1" lang="ja-JP" altLang="en-US"/>
+          </a:p>
+        </p:txBody>
+      </p:sp>
+      <p:sp>
+        <p:nvSpPr>
+          <p:cNvPr id="91" name="テキスト ボックス 90"/>
+          <p:cNvSpPr txBox="1"/>
+          <p:nvPr/>
+        </p:nvSpPr>
+        <p:spPr>
+          <a:xfrm>
+            <a:off x="8927473" y="6453920"/>
+            <a:ext cx="1758011" cy="1154162"/>
+          </a:xfrm>
+          <a:prstGeom prst="rect">
+            <a:avLst/>
+          </a:prstGeom>
+          <a:noFill/>
+        </p:spPr>
+        <p:txBody>
+          <a:bodyPr wrap="square" rtlCol="0">
+            <a:spAutoFit/>
+          </a:bodyPr>
+          <a:lstStyle/>
+          <a:p>
+            <a:r>
+              <a:rPr lang="ja-JP" altLang="en-US" sz="1100" dirty="0" smtClean="0">
+                <a:latin typeface="メイリオ" pitchFamily="50" charset="-128"/>
+                <a:ea typeface="メイリオ" pitchFamily="50" charset="-128"/>
+                <a:cs typeface="メイリオ" pitchFamily="50" charset="-128"/>
+              </a:rPr>
+              <a:t>①　左へ旋回</a:t>
+            </a:r>
+            <a:endParaRPr lang="en-US" altLang="ja-JP" sz="1100" dirty="0" smtClean="0">
+              <a:latin typeface="メイリオ" pitchFamily="50" charset="-128"/>
+              <a:ea typeface="メイリオ" pitchFamily="50" charset="-128"/>
+              <a:cs typeface="メイリオ" pitchFamily="50" charset="-128"/>
+            </a:endParaRPr>
+          </a:p>
+          <a:p>
+            <a:r>
+              <a:rPr lang="ja-JP" altLang="en-US" sz="1100" dirty="0" smtClean="0">
+                <a:latin typeface="メイリオ" pitchFamily="50" charset="-128"/>
+                <a:ea typeface="メイリオ" pitchFamily="50" charset="-128"/>
+                <a:cs typeface="メイリオ" pitchFamily="50" charset="-128"/>
+              </a:rPr>
+              <a:t>②　ライン</a:t>
+            </a:r>
+            <a:r>
+              <a:rPr lang="ja-JP" altLang="en-US" sz="1100" dirty="0">
+                <a:latin typeface="メイリオ" pitchFamily="50" charset="-128"/>
+                <a:ea typeface="メイリオ" pitchFamily="50" charset="-128"/>
+                <a:cs typeface="メイリオ" pitchFamily="50" charset="-128"/>
+              </a:rPr>
+              <a:t>は左側</a:t>
+            </a:r>
+            <a:r>
+              <a:rPr lang="ja-JP" altLang="en-US" sz="1100" dirty="0" smtClean="0">
+                <a:latin typeface="メイリオ" pitchFamily="50" charset="-128"/>
+                <a:ea typeface="メイリオ" pitchFamily="50" charset="-128"/>
+                <a:cs typeface="メイリオ" pitchFamily="50" charset="-128"/>
+              </a:rPr>
+              <a:t>にはないと判断</a:t>
+            </a:r>
+            <a:r>
+              <a:rPr lang="en-US" altLang="ja-JP" sz="1100" dirty="0" smtClean="0">
+                <a:latin typeface="メイリオ" pitchFamily="50" charset="-128"/>
+                <a:ea typeface="メイリオ" pitchFamily="50" charset="-128"/>
+                <a:cs typeface="メイリオ" pitchFamily="50" charset="-128"/>
+              </a:rPr>
+              <a:t/>
+            </a:r>
+            <a:br>
+              <a:rPr lang="en-US" altLang="ja-JP" sz="1100" dirty="0" smtClean="0">
+                <a:latin typeface="メイリオ" pitchFamily="50" charset="-128"/>
+                <a:ea typeface="メイリオ" pitchFamily="50" charset="-128"/>
+                <a:cs typeface="メイリオ" pitchFamily="50" charset="-128"/>
+              </a:rPr>
+            </a:br>
+            <a:r>
+              <a:rPr lang="ja-JP" altLang="en-US" sz="1100" dirty="0" smtClean="0">
+                <a:latin typeface="メイリオ" pitchFamily="50" charset="-128"/>
+                <a:ea typeface="メイリオ" pitchFamily="50" charset="-128"/>
+                <a:cs typeface="メイリオ" pitchFamily="50" charset="-128"/>
+              </a:rPr>
+              <a:t>③　右へ旋回</a:t>
+            </a:r>
+            <a:r>
+              <a:rPr lang="en-US" altLang="ja-JP" sz="1100" dirty="0" smtClean="0">
+                <a:latin typeface="メイリオ" pitchFamily="50" charset="-128"/>
+                <a:ea typeface="メイリオ" pitchFamily="50" charset="-128"/>
+                <a:cs typeface="メイリオ" pitchFamily="50" charset="-128"/>
+              </a:rPr>
+              <a:t/>
+            </a:r>
+            <a:br>
+              <a:rPr lang="en-US" altLang="ja-JP" sz="1100" dirty="0" smtClean="0">
+                <a:latin typeface="メイリオ" pitchFamily="50" charset="-128"/>
+                <a:ea typeface="メイリオ" pitchFamily="50" charset="-128"/>
+                <a:cs typeface="メイリオ" pitchFamily="50" charset="-128"/>
+              </a:rPr>
+            </a:br>
+            <a:r>
+              <a:rPr lang="ja-JP" altLang="en-US" sz="1100" dirty="0" smtClean="0">
+                <a:latin typeface="メイリオ" pitchFamily="50" charset="-128"/>
+                <a:ea typeface="メイリオ" pitchFamily="50" charset="-128"/>
+                <a:cs typeface="メイリオ" pitchFamily="50" charset="-128"/>
+              </a:rPr>
+              <a:t>④　ラインへ復帰</a:t>
+            </a:r>
+            <a:endParaRPr lang="ja-JP" altLang="en-US" sz="1100" dirty="0">
+              <a:latin typeface="メイリオ" pitchFamily="50" charset="-128"/>
+              <a:ea typeface="メイリオ" pitchFamily="50" charset="-128"/>
+              <a:cs typeface="メイリオ" pitchFamily="50" charset="-128"/>
+            </a:endParaRPr>
+          </a:p>
+          <a:p>
+            <a:endParaRPr kumimoji="1" lang="ja-JP" altLang="en-US" sz="1400" dirty="0">
+              <a:latin typeface="メイリオ" pitchFamily="50" charset="-128"/>
+              <a:ea typeface="メイリオ" pitchFamily="50" charset="-128"/>
+              <a:cs typeface="メイリオ" pitchFamily="50" charset="-128"/>
+            </a:endParaRPr>
+          </a:p>
+        </p:txBody>
+      </p:sp>
+      <p:sp>
+        <p:nvSpPr>
+          <p:cNvPr id="106" name="テキスト ボックス 105"/>
+          <p:cNvSpPr txBox="1"/>
+          <p:nvPr/>
+        </p:nvSpPr>
+        <p:spPr>
+          <a:xfrm>
+            <a:off x="9756217" y="8185446"/>
+            <a:ext cx="353145" cy="307777"/>
+          </a:xfrm>
+          <a:prstGeom prst="rect">
+            <a:avLst/>
+          </a:prstGeom>
+          <a:noFill/>
+        </p:spPr>
+        <p:txBody>
+          <a:bodyPr wrap="square" rtlCol="0">
+            <a:spAutoFit/>
+          </a:bodyPr>
+          <a:lstStyle/>
+          <a:p>
+            <a:r>
+              <a:rPr lang="ja-JP" altLang="en-US" sz="1400" dirty="0">
+                <a:latin typeface="メイリオ" pitchFamily="50" charset="-128"/>
+                <a:ea typeface="メイリオ" pitchFamily="50" charset="-128"/>
+                <a:cs typeface="メイリオ" pitchFamily="50" charset="-128"/>
+              </a:rPr>
+              <a:t>③</a:t>
+            </a:r>
+            <a:endParaRPr kumimoji="1" lang="ja-JP" altLang="en-US" sz="1400" dirty="0">
+              <a:latin typeface="メイリオ" pitchFamily="50" charset="-128"/>
+              <a:ea typeface="メイリオ" pitchFamily="50" charset="-128"/>
+              <a:cs typeface="メイリオ" pitchFamily="50" charset="-128"/>
+            </a:endParaRPr>
+          </a:p>
+        </p:txBody>
+      </p:sp>
+      <p:sp>
+        <p:nvSpPr>
+          <p:cNvPr id="107" name="テキスト ボックス 106"/>
+          <p:cNvSpPr txBox="1"/>
+          <p:nvPr/>
+        </p:nvSpPr>
+        <p:spPr>
+          <a:xfrm>
+            <a:off x="10658305" y="6424822"/>
+            <a:ext cx="1885679" cy="1323439"/>
+          </a:xfrm>
+          <a:prstGeom prst="rect">
+            <a:avLst/>
+          </a:prstGeom>
+          <a:noFill/>
+        </p:spPr>
+        <p:txBody>
+          <a:bodyPr wrap="square" rtlCol="0">
+            <a:spAutoFit/>
+          </a:bodyPr>
+          <a:lstStyle/>
+          <a:p>
+            <a:r>
+              <a:rPr lang="ja-JP" altLang="en-US" sz="1100" dirty="0" smtClean="0">
+                <a:latin typeface="メイリオ" pitchFamily="50" charset="-128"/>
+                <a:ea typeface="メイリオ" pitchFamily="50" charset="-128"/>
+                <a:cs typeface="メイリオ" pitchFamily="50" charset="-128"/>
+              </a:rPr>
+              <a:t>①　左</a:t>
+            </a:r>
+            <a:r>
+              <a:rPr lang="ja-JP" altLang="en-US" sz="1100" dirty="0">
+                <a:latin typeface="メイリオ" pitchFamily="50" charset="-128"/>
+                <a:ea typeface="メイリオ" pitchFamily="50" charset="-128"/>
+                <a:cs typeface="メイリオ" pitchFamily="50" charset="-128"/>
+              </a:rPr>
+              <a:t>へ旋回</a:t>
+            </a:r>
+            <a:r>
+              <a:rPr lang="ja-JP" altLang="en-US" sz="1100" dirty="0" smtClean="0">
+                <a:latin typeface="メイリオ" pitchFamily="50" charset="-128"/>
+                <a:ea typeface="メイリオ" pitchFamily="50" charset="-128"/>
+                <a:cs typeface="メイリオ" pitchFamily="50" charset="-128"/>
+              </a:rPr>
+              <a:t>し光センサの値からラインが</a:t>
+            </a:r>
+            <a:r>
+              <a:rPr lang="ja-JP" altLang="en-US" sz="1100" dirty="0">
+                <a:latin typeface="メイリオ" pitchFamily="50" charset="-128"/>
+                <a:ea typeface="メイリオ" pitchFamily="50" charset="-128"/>
+                <a:cs typeface="メイリオ" pitchFamily="50" charset="-128"/>
+              </a:rPr>
+              <a:t>左側にあると判断</a:t>
+            </a:r>
+            <a:endParaRPr lang="en-US" altLang="ja-JP" sz="1100" dirty="0" smtClean="0">
+              <a:latin typeface="メイリオ" pitchFamily="50" charset="-128"/>
+              <a:ea typeface="メイリオ" pitchFamily="50" charset="-128"/>
+              <a:cs typeface="メイリオ" pitchFamily="50" charset="-128"/>
+            </a:endParaRPr>
+          </a:p>
+          <a:p>
+            <a:r>
+              <a:rPr lang="ja-JP" altLang="en-US" sz="1100" dirty="0" smtClean="0">
+                <a:latin typeface="メイリオ" pitchFamily="50" charset="-128"/>
+                <a:ea typeface="メイリオ" pitchFamily="50" charset="-128"/>
+                <a:cs typeface="メイリオ" pitchFamily="50" charset="-128"/>
+              </a:rPr>
+              <a:t>②　</a:t>
+            </a:r>
+            <a:r>
+              <a:rPr lang="ja-JP" altLang="en-US" sz="1100" dirty="0">
+                <a:latin typeface="メイリオ" pitchFamily="50" charset="-128"/>
+                <a:ea typeface="メイリオ" pitchFamily="50" charset="-128"/>
+                <a:cs typeface="メイリオ" pitchFamily="50" charset="-128"/>
+              </a:rPr>
+              <a:t>右へ旋回</a:t>
+            </a:r>
+            <a:r>
+              <a:rPr lang="en-US" altLang="ja-JP" sz="1100" dirty="0" smtClean="0">
+                <a:latin typeface="メイリオ" pitchFamily="50" charset="-128"/>
+                <a:ea typeface="メイリオ" pitchFamily="50" charset="-128"/>
+                <a:cs typeface="メイリオ" pitchFamily="50" charset="-128"/>
+              </a:rPr>
+              <a:t/>
+            </a:r>
+            <a:br>
+              <a:rPr lang="en-US" altLang="ja-JP" sz="1100" dirty="0" smtClean="0">
+                <a:latin typeface="メイリオ" pitchFamily="50" charset="-128"/>
+                <a:ea typeface="メイリオ" pitchFamily="50" charset="-128"/>
+                <a:cs typeface="メイリオ" pitchFamily="50" charset="-128"/>
+              </a:rPr>
+            </a:br>
+            <a:r>
+              <a:rPr lang="ja-JP" altLang="en-US" sz="1100" dirty="0" smtClean="0">
+                <a:latin typeface="メイリオ" pitchFamily="50" charset="-128"/>
+                <a:ea typeface="メイリオ" pitchFamily="50" charset="-128"/>
+                <a:cs typeface="メイリオ" pitchFamily="50" charset="-128"/>
+              </a:rPr>
+              <a:t>③　ラインに向かって直進</a:t>
+            </a:r>
+            <a:r>
+              <a:rPr lang="en-US" altLang="ja-JP" sz="1100" dirty="0" smtClean="0">
+                <a:latin typeface="メイリオ" pitchFamily="50" charset="-128"/>
+                <a:ea typeface="メイリオ" pitchFamily="50" charset="-128"/>
+                <a:cs typeface="メイリオ" pitchFamily="50" charset="-128"/>
+              </a:rPr>
+              <a:t/>
+            </a:r>
+            <a:br>
+              <a:rPr lang="en-US" altLang="ja-JP" sz="1100" dirty="0" smtClean="0">
+                <a:latin typeface="メイリオ" pitchFamily="50" charset="-128"/>
+                <a:ea typeface="メイリオ" pitchFamily="50" charset="-128"/>
+                <a:cs typeface="メイリオ" pitchFamily="50" charset="-128"/>
+              </a:rPr>
+            </a:br>
+            <a:r>
+              <a:rPr lang="ja-JP" altLang="en-US" sz="1100" dirty="0" smtClean="0">
+                <a:latin typeface="メイリオ" pitchFamily="50" charset="-128"/>
+                <a:ea typeface="メイリオ" pitchFamily="50" charset="-128"/>
+                <a:cs typeface="メイリオ" pitchFamily="50" charset="-128"/>
+              </a:rPr>
+              <a:t>④　ラインへ復帰</a:t>
+            </a:r>
+            <a:endParaRPr lang="ja-JP" altLang="en-US" sz="1100" dirty="0">
+              <a:latin typeface="メイリオ" pitchFamily="50" charset="-128"/>
+              <a:ea typeface="メイリオ" pitchFamily="50" charset="-128"/>
+              <a:cs typeface="メイリオ" pitchFamily="50" charset="-128"/>
+            </a:endParaRPr>
+          </a:p>
+          <a:p>
+            <a:endParaRPr kumimoji="1" lang="ja-JP" altLang="en-US" sz="1400" dirty="0">
+              <a:latin typeface="メイリオ" pitchFamily="50" charset="-128"/>
+              <a:ea typeface="メイリオ" pitchFamily="50" charset="-128"/>
+              <a:cs typeface="メイリオ" pitchFamily="50" charset="-128"/>
+            </a:endParaRPr>
           </a:p>
         </p:txBody>
       </p:sp>

</xml_diff>